<commit_message>
There is no h in my name
</commit_message>
<xml_diff>
--- a/Slides/final_slides.pptx
+++ b/Slides/final_slides.pptx
@@ -5,16 +5,18 @@
     <p:sldMasterId id="2147483648" r:id="rId1"/>
   </p:sldMasterIdLst>
   <p:notesMasterIdLst>
-    <p:notesMasterId r:id="rId6"/>
+    <p:notesMasterId r:id="rId8"/>
   </p:notesMasterIdLst>
   <p:handoutMasterIdLst>
-    <p:handoutMasterId r:id="rId7"/>
+    <p:handoutMasterId r:id="rId9"/>
   </p:handoutMasterIdLst>
   <p:sldIdLst>
     <p:sldId id="256" r:id="rId2"/>
     <p:sldId id="257" r:id="rId3"/>
     <p:sldId id="258" r:id="rId4"/>
     <p:sldId id="261" r:id="rId5"/>
+    <p:sldId id="262" r:id="rId6"/>
+    <p:sldId id="263" r:id="rId7"/>
   </p:sldIdLst>
   <p:sldSz cx="12192000" cy="6858000"/>
   <p:notesSz cx="6858000" cy="9144000"/>
@@ -4056,8 +4058,10 @@
       </p:sp>
       <p:pic>
         <p:nvPicPr>
-          <p:cNvPr id="4" name="Picture 3" descr="Featured image"/>
-          <p:cNvPicPr/>
+          <p:cNvPr id="3074" name="Picture 2" descr="https://tribwgntv.files.wordpress.com/2017/01/twwet.png"/>
+          <p:cNvPicPr>
+            <a:picLocks noChangeAspect="1" noChangeArrowheads="1"/>
+          </p:cNvPicPr>
           <p:nvPr/>
         </p:nvPicPr>
         <p:blipFill>
@@ -4075,16 +4079,99 @@
         </p:blipFill>
         <p:spPr bwMode="auto">
           <a:xfrm>
-            <a:off x="2057400" y="1905000"/>
-            <a:ext cx="8001000" cy="4419600"/>
+            <a:off x="482498" y="1855410"/>
+            <a:ext cx="7975702" cy="4057650"/>
+          </a:xfrm>
+          <a:prstGeom prst="rect">
+            <a:avLst/>
+          </a:prstGeom>
+          <a:solidFill>
+            <a:schemeClr val="bg1"/>
+          </a:solidFill>
+        </p:spPr>
+      </p:pic>
+      <p:sp>
+        <p:nvSpPr>
+          <p:cNvPr id="3" name="TextBox 2"/>
+          <p:cNvSpPr txBox="1"/>
+          <p:nvPr/>
+        </p:nvSpPr>
+        <p:spPr>
+          <a:xfrm>
+            <a:off x="8458200" y="4343400"/>
+            <a:ext cx="3429000" cy="1569660"/>
           </a:xfrm>
           <a:prstGeom prst="rect">
             <a:avLst/>
           </a:prstGeom>
           <a:noFill/>
-          <a:ln>
-            <a:noFill/>
-          </a:ln>
+        </p:spPr>
+        <p:txBody>
+          <a:bodyPr wrap="square" rtlCol="0">
+            <a:spAutoFit/>
+          </a:bodyPr>
+          <a:lstStyle/>
+          <a:p>
+            <a:pPr marL="285750" indent="-285750">
+              <a:buFont typeface="Arial" panose="020B0604020202020204" pitchFamily="34" charset="0"/>
+              <a:buChar char="•"/>
+            </a:pPr>
+            <a:r>
+              <a:rPr lang="en-US" sz="3200" dirty="0"/>
+              <a:t>4,367 shooting victims in 2016</a:t>
+            </a:r>
+          </a:p>
+          <a:p>
+            <a:pPr marL="285750" indent="-285750">
+              <a:buFont typeface="Arial" panose="020B0604020202020204" pitchFamily="34" charset="0"/>
+              <a:buChar char="•"/>
+            </a:pPr>
+            <a:r>
+              <a:rPr lang="en-US" sz="3200" dirty="0"/>
+              <a:t>735 homicides</a:t>
+            </a:r>
+          </a:p>
+        </p:txBody>
+      </p:sp>
+      <p:pic>
+        <p:nvPicPr>
+          <p:cNvPr id="3076" name="Picture 4" descr="https://upload.wikimedia.org/wikipedia/en/thumb/e/e7/ChiRaqMoviePoster.png/220px-ChiRaqMoviePoster.png"/>
+          <p:cNvPicPr>
+            <a:picLocks noChangeAspect="1" noChangeArrowheads="1"/>
+          </p:cNvPicPr>
+          <p:nvPr/>
+        </p:nvPicPr>
+        <p:blipFill>
+          <a:blip r:embed="rId3">
+            <a:extLst>
+              <a:ext uri="{28A0092B-C50C-407E-A947-70E740481C1C}">
+                <a14:useLocalDpi xmlns:a14="http://schemas.microsoft.com/office/drawing/2010/main" val="0"/>
+              </a:ext>
+            </a:extLst>
+          </a:blip>
+          <a:srcRect/>
+          <a:stretch>
+            <a:fillRect/>
+          </a:stretch>
+        </p:blipFill>
+        <p:spPr bwMode="auto">
+          <a:xfrm>
+            <a:off x="8896350" y="365126"/>
+            <a:ext cx="2552700" cy="3782637"/>
+          </a:xfrm>
+          <a:prstGeom prst="rect">
+            <a:avLst/>
+          </a:prstGeom>
+          <a:noFill/>
+          <a:extLst>
+            <a:ext uri="{909E8E84-426E-40DD-AFC4-6F175D3DCCD1}">
+              <a14:hiddenFill xmlns:a14="http://schemas.microsoft.com/office/drawing/2010/main">
+                <a:solidFill>
+                  <a:srgbClr val="FFFFFF"/>
+                </a:solidFill>
+              </a14:hiddenFill>
+            </a:ext>
+          </a:extLst>
         </p:spPr>
       </p:pic>
     </p:spTree>
@@ -4239,7 +4326,7 @@
           <a:p>
             <a:r>
               <a:rPr lang="en-US" dirty="0"/>
-              <a:t>Add a Slide Title - 1</a:t>
+              <a:t>ARIMA Modeling</a:t>
             </a:r>
           </a:p>
         </p:txBody>
@@ -4267,6 +4354,200 @@
     <p:extLst>
       <p:ext uri="{BB962C8B-B14F-4D97-AF65-F5344CB8AC3E}">
         <p14:creationId xmlns:p14="http://schemas.microsoft.com/office/powerpoint/2010/main" val="1783796071"/>
+      </p:ext>
+    </p:extLst>
+  </p:cSld>
+  <p:clrMapOvr>
+    <a:masterClrMapping/>
+  </p:clrMapOvr>
+  <mc:AlternateContent xmlns:mc="http://schemas.openxmlformats.org/markup-compatibility/2006" xmlns:p14="http://schemas.microsoft.com/office/powerpoint/2010/main">
+    <mc:Choice Requires="p14">
+      <p:transition spd="med" p14:dur="700">
+        <p:fade/>
+      </p:transition>
+    </mc:Choice>
+    <mc:Fallback xmlns="">
+      <p:transition spd="med">
+        <p:fade/>
+      </p:transition>
+    </mc:Fallback>
+  </mc:AlternateContent>
+</p:sld>
+</file>
+
+<file path=ppt/slides/slide5.xml><?xml version="1.0" encoding="utf-8"?>
+<p:sld xmlns:a="http://schemas.openxmlformats.org/drawingml/2006/main" xmlns:r="http://schemas.openxmlformats.org/officeDocument/2006/relationships" xmlns:p="http://schemas.openxmlformats.org/presentationml/2006/main">
+  <p:cSld>
+    <p:spTree>
+      <p:nvGrpSpPr>
+        <p:cNvPr id="1" name=""/>
+        <p:cNvGrpSpPr/>
+        <p:nvPr/>
+      </p:nvGrpSpPr>
+      <p:grpSpPr>
+        <a:xfrm>
+          <a:off x="0" y="0"/>
+          <a:ext cx="0" cy="0"/>
+          <a:chOff x="0" y="0"/>
+          <a:chExt cx="0" cy="0"/>
+        </a:xfrm>
+      </p:grpSpPr>
+      <p:pic>
+        <p:nvPicPr>
+          <p:cNvPr id="1026" name="Picture 2" descr="https://upload.wikimedia.org/wikipedia/commons/thumb/2/24/Map_of_the_Community_Areas_and_%27Sides%27_of_the_City_of_Chicago.svg/350px-Map_of_the_Community_Areas_and_%27Sides%27_of_the_City_of_Chicago.svg.png"/>
+          <p:cNvPicPr>
+            <a:picLocks noChangeAspect="1" noChangeArrowheads="1"/>
+          </p:cNvPicPr>
+          <p:nvPr/>
+        </p:nvPicPr>
+        <p:blipFill>
+          <a:blip r:embed="rId2">
+            <a:extLst>
+              <a:ext uri="{28A0092B-C50C-407E-A947-70E740481C1C}">
+                <a14:useLocalDpi xmlns:a14="http://schemas.microsoft.com/office/drawing/2010/main" val="0"/>
+              </a:ext>
+            </a:extLst>
+          </a:blip>
+          <a:srcRect/>
+          <a:stretch>
+            <a:fillRect/>
+          </a:stretch>
+        </p:blipFill>
+        <p:spPr bwMode="auto">
+          <a:xfrm>
+            <a:off x="1295400" y="674424"/>
+            <a:ext cx="4343400" cy="5621601"/>
+          </a:xfrm>
+          <a:prstGeom prst="rect">
+            <a:avLst/>
+          </a:prstGeom>
+          <a:solidFill>
+            <a:schemeClr val="accent1"/>
+          </a:solidFill>
+        </p:spPr>
+      </p:pic>
+    </p:spTree>
+    <p:extLst>
+      <p:ext uri="{BB962C8B-B14F-4D97-AF65-F5344CB8AC3E}">
+        <p14:creationId xmlns:p14="http://schemas.microsoft.com/office/powerpoint/2010/main" val="1841336679"/>
+      </p:ext>
+    </p:extLst>
+  </p:cSld>
+  <p:clrMapOvr>
+    <a:masterClrMapping/>
+  </p:clrMapOvr>
+  <mc:AlternateContent xmlns:mc="http://schemas.openxmlformats.org/markup-compatibility/2006" xmlns:p14="http://schemas.microsoft.com/office/powerpoint/2010/main">
+    <mc:Choice Requires="p14">
+      <p:transition spd="med" p14:dur="700">
+        <p:fade/>
+      </p:transition>
+    </mc:Choice>
+    <mc:Fallback xmlns="">
+      <p:transition spd="med">
+        <p:fade/>
+      </p:transition>
+    </mc:Fallback>
+  </mc:AlternateContent>
+</p:sld>
+</file>
+
+<file path=ppt/slides/slide6.xml><?xml version="1.0" encoding="utf-8"?>
+<p:sld xmlns:a="http://schemas.openxmlformats.org/drawingml/2006/main" xmlns:r="http://schemas.openxmlformats.org/officeDocument/2006/relationships" xmlns:p="http://schemas.openxmlformats.org/presentationml/2006/main">
+  <p:cSld>
+    <p:spTree>
+      <p:nvGrpSpPr>
+        <p:cNvPr id="1" name=""/>
+        <p:cNvGrpSpPr/>
+        <p:nvPr/>
+      </p:nvGrpSpPr>
+      <p:grpSpPr>
+        <a:xfrm>
+          <a:off x="0" y="0"/>
+          <a:ext cx="0" cy="0"/>
+          <a:chOff x="0" y="0"/>
+          <a:chExt cx="0" cy="0"/>
+        </a:xfrm>
+      </p:grpSpPr>
+      <p:sp>
+        <p:nvSpPr>
+          <p:cNvPr id="2" name="Title 1"/>
+          <p:cNvSpPr>
+            <a:spLocks noGrp="1"/>
+          </p:cNvSpPr>
+          <p:nvPr>
+            <p:ph type="title"/>
+          </p:nvPr>
+        </p:nvSpPr>
+        <p:spPr>
+          <a:xfrm>
+            <a:off x="838200" y="365126"/>
+            <a:ext cx="10515600" cy="1145224"/>
+          </a:xfrm>
+        </p:spPr>
+        <p:txBody>
+          <a:bodyPr/>
+          <a:lstStyle/>
+          <a:p>
+            <a:r>
+              <a:rPr lang="en-US" dirty="0"/>
+              <a:t>Images</a:t>
+            </a:r>
+          </a:p>
+        </p:txBody>
+      </p:sp>
+      <p:sp>
+        <p:nvSpPr>
+          <p:cNvPr id="3" name="Content Placeholder 2"/>
+          <p:cNvSpPr>
+            <a:spLocks noGrp="1"/>
+          </p:cNvSpPr>
+          <p:nvPr>
+            <p:ph idx="1"/>
+          </p:nvPr>
+        </p:nvSpPr>
+        <p:spPr/>
+        <p:txBody>
+          <a:bodyPr/>
+          <a:lstStyle/>
+          <a:p>
+            <a:r>
+              <a:rPr lang="en-US" dirty="0"/>
+              <a:t>Trump – </a:t>
+            </a:r>
+            <a:r>
+              <a:rPr lang="en-US" dirty="0">
+                <a:hlinkClick r:id="rId2"/>
+              </a:rPr>
+              <a:t>https://tribwgntv.files.wordpress.com/2017/01/twwet.png</a:t>
+            </a:r>
+            <a:endParaRPr lang="en-US" dirty="0"/>
+          </a:p>
+          <a:p>
+            <a:r>
+              <a:rPr lang="en-US" dirty="0"/>
+              <a:t>Chi-</a:t>
+            </a:r>
+            <a:r>
+              <a:rPr lang="en-US" dirty="0" err="1"/>
+              <a:t>raq</a:t>
+            </a:r>
+            <a:r>
+              <a:rPr lang="en-US" dirty="0"/>
+              <a:t> https://upload.wikimedia.org/wikipedia/en/thumb/e/e7/ChiRaqMoviePoster.png/220px-ChiRaqMoviePoster.png</a:t>
+            </a:r>
+          </a:p>
+          <a:p>
+            <a:r>
+              <a:rPr lang="en-US" dirty="0"/>
+              <a:t>Communities - https://upload.wikimedia.org/wikipedia/commons/thumb/2/24/Map_of_the_Community_Areas_and_%27Sides%27_of_the_City_of_Chicago.svg/350px-Map_of_the_Community_Areas_and_%27Sides%27_of_the_City_of_Chicago.svg.png</a:t>
+            </a:r>
+          </a:p>
+        </p:txBody>
+      </p:sp>
+    </p:spTree>
+    <p:extLst>
+      <p:ext uri="{BB962C8B-B14F-4D97-AF65-F5344CB8AC3E}">
+        <p14:creationId xmlns:p14="http://schemas.microsoft.com/office/powerpoint/2010/main" val="986977783"/>
       </p:ext>
     </p:extLst>
   </p:cSld>

</xml_diff>

<commit_message>
Added temporal plots  to slides
</commit_message>
<xml_diff>
--- a/Slides/final_slides.pptx
+++ b/Slides/final_slides.pptx
@@ -6,10 +6,10 @@
     <p:sldMasterId id="2147483660" r:id="rId2"/>
   </p:sldMasterIdLst>
   <p:notesMasterIdLst>
-    <p:notesMasterId r:id="rId16"/>
+    <p:notesMasterId r:id="rId20"/>
   </p:notesMasterIdLst>
   <p:handoutMasterIdLst>
-    <p:handoutMasterId r:id="rId17"/>
+    <p:handoutMasterId r:id="rId21"/>
   </p:handoutMasterIdLst>
   <p:sldIdLst>
     <p:sldId id="256" r:id="rId3"/>
@@ -17,14 +17,18 @@
     <p:sldId id="258" r:id="rId5"/>
     <p:sldId id="270" r:id="rId6"/>
     <p:sldId id="261" r:id="rId7"/>
-    <p:sldId id="262" r:id="rId8"/>
-    <p:sldId id="263" r:id="rId9"/>
-    <p:sldId id="264" r:id="rId10"/>
-    <p:sldId id="265" r:id="rId11"/>
-    <p:sldId id="266" r:id="rId12"/>
-    <p:sldId id="267" r:id="rId13"/>
-    <p:sldId id="268" r:id="rId14"/>
-    <p:sldId id="269" r:id="rId15"/>
+    <p:sldId id="271" r:id="rId8"/>
+    <p:sldId id="272" r:id="rId9"/>
+    <p:sldId id="273" r:id="rId10"/>
+    <p:sldId id="274" r:id="rId11"/>
+    <p:sldId id="275" r:id="rId12"/>
+    <p:sldId id="264" r:id="rId13"/>
+    <p:sldId id="265" r:id="rId14"/>
+    <p:sldId id="266" r:id="rId15"/>
+    <p:sldId id="267" r:id="rId16"/>
+    <p:sldId id="268" r:id="rId17"/>
+    <p:sldId id="277" r:id="rId18"/>
+    <p:sldId id="269" r:id="rId19"/>
   </p:sldIdLst>
   <p:sldSz cx="12192000" cy="6858000"/>
   <p:notesSz cx="6858000" cy="9144000"/>
@@ -125,10 +129,10 @@
   </p:defaultTextStyle>
   <p:extLst>
     <p:ext uri="{EFAFB233-063F-42B5-8137-9DF3F51BA10A}">
-      <p15:sldGuideLst xmlns:p15="http://schemas.microsoft.com/office/powerpoint/2012/main" xmlns=""/>
+      <p15:sldGuideLst xmlns="" xmlns:p15="http://schemas.microsoft.com/office/powerpoint/2012/main"/>
     </p:ext>
     <p:ext uri="{2D200454-40CA-4A62-9FC3-DE9A4176ACB9}">
-      <p15:notesGuideLst xmlns:p15="http://schemas.microsoft.com/office/powerpoint/2012/main" xmlns=""/>
+      <p15:notesGuideLst xmlns="" xmlns:p15="http://schemas.microsoft.com/office/powerpoint/2012/main"/>
     </p:ext>
   </p:extLst>
 </p:presentation>
@@ -6731,7 +6735,7 @@
   </p:txStyles>
   <p:extLst mod="1">
     <p:ext uri="{27BBF7A9-308A-43DC-89C8-2F10F3537804}">
-      <p15:sldGuideLst xmlns:p15="http://schemas.microsoft.com/office/powerpoint/2012/main" xmlns="">
+      <p15:sldGuideLst xmlns="" xmlns:p15="http://schemas.microsoft.com/office/powerpoint/2012/main">
         <p15:guide id="1" pos="3840" userDrawn="1">
           <p15:clr>
             <a:srgbClr val="F26B43"/>
@@ -7182,6 +7186,13 @@
       </p:transition>
     </mc:Fallback>
   </mc:AlternateContent>
+  <p:timing>
+    <p:tnLst>
+      <p:par>
+        <p:cTn xmlns:p14="http://schemas.microsoft.com/office/powerpoint/2010/main" id="1" dur="indefinite" restart="never" nodeType="tmRoot"/>
+      </p:par>
+    </p:tnLst>
+  </p:timing>
 </p:sld>
 </file>
 
@@ -7212,6 +7223,422 @@
       </p:grpSpPr>
       <p:sp>
         <p:nvSpPr>
+          <p:cNvPr id="7" name="Title 1"/>
+          <p:cNvSpPr>
+            <a:spLocks noGrp="1"/>
+          </p:cNvSpPr>
+          <p:nvPr>
+            <p:ph type="title"/>
+          </p:nvPr>
+        </p:nvSpPr>
+        <p:spPr>
+          <a:xfrm>
+            <a:off x="838200" y="-76200"/>
+            <a:ext cx="10515600" cy="1145224"/>
+          </a:xfrm>
+        </p:spPr>
+        <p:txBody>
+          <a:bodyPr/>
+          <a:lstStyle/>
+          <a:p>
+            <a:r>
+              <a:rPr lang="en-US" dirty="0">
+                <a:solidFill>
+                  <a:schemeClr val="accent6">
+                    <a:lumMod val="75000"/>
+                  </a:schemeClr>
+                </a:solidFill>
+                <a:latin typeface="Helvetica"/>
+                <a:cs typeface="Helvetica"/>
+              </a:rPr>
+              <a:t>South Side - ARIMA(4,0,0)x(1,0,0)[12</a:t>
+            </a:r>
+            <a:r>
+              <a:rPr lang="en-US" dirty="0" smtClean="0">
+                <a:solidFill>
+                  <a:schemeClr val="accent6">
+                    <a:lumMod val="75000"/>
+                  </a:schemeClr>
+                </a:solidFill>
+                <a:latin typeface="Helvetica"/>
+                <a:cs typeface="Helvetica"/>
+              </a:rPr>
+              <a:t>], cont.</a:t>
+            </a:r>
+            <a:endParaRPr lang="en-US" dirty="0">
+              <a:solidFill>
+                <a:schemeClr val="accent6">
+                  <a:lumMod val="75000"/>
+                </a:schemeClr>
+              </a:solidFill>
+              <a:latin typeface="Helvetica"/>
+              <a:cs typeface="Helvetica"/>
+            </a:endParaRPr>
+          </a:p>
+        </p:txBody>
+      </p:sp>
+      <p:pic>
+        <p:nvPicPr>
+          <p:cNvPr id="3" name="Picture 2" descr="south_resid_ACF.png"/>
+          <p:cNvPicPr>
+            <a:picLocks noChangeAspect="1"/>
+          </p:cNvPicPr>
+          <p:nvPr/>
+        </p:nvPicPr>
+        <p:blipFill rotWithShape="1">
+          <a:blip r:embed="rId2">
+            <a:extLst>
+              <a:ext uri="{28A0092B-C50C-407E-A947-70E740481C1C}">
+                <a14:useLocalDpi xmlns:a14="http://schemas.microsoft.com/office/drawing/2010/main" val="0"/>
+              </a:ext>
+            </a:extLst>
+          </a:blip>
+          <a:srcRect t="24185" b="5435"/>
+          <a:stretch/>
+        </p:blipFill>
+        <p:spPr>
+          <a:xfrm>
+            <a:off x="1905000" y="1371600"/>
+            <a:ext cx="8382000" cy="2572198"/>
+          </a:xfrm>
+          <a:prstGeom prst="rect">
+            <a:avLst/>
+          </a:prstGeom>
+        </p:spPr>
+      </p:pic>
+      <p:pic>
+        <p:nvPicPr>
+          <p:cNvPr id="5" name="Picture 4" descr="south_resid_PACF.png"/>
+          <p:cNvPicPr>
+            <a:picLocks noChangeAspect="1"/>
+          </p:cNvPicPr>
+          <p:nvPr/>
+        </p:nvPicPr>
+        <p:blipFill rotWithShape="1">
+          <a:blip r:embed="rId3">
+            <a:extLst>
+              <a:ext uri="{28A0092B-C50C-407E-A947-70E740481C1C}">
+                <a14:useLocalDpi xmlns:a14="http://schemas.microsoft.com/office/drawing/2010/main" val="0"/>
+              </a:ext>
+            </a:extLst>
+          </a:blip>
+          <a:srcRect t="25378" b="6031"/>
+          <a:stretch/>
+        </p:blipFill>
+        <p:spPr>
+          <a:xfrm>
+            <a:off x="1905000" y="3886200"/>
+            <a:ext cx="8408071" cy="2514600"/>
+          </a:xfrm>
+          <a:prstGeom prst="rect">
+            <a:avLst/>
+          </a:prstGeom>
+        </p:spPr>
+      </p:pic>
+    </p:spTree>
+    <p:extLst>
+      <p:ext uri="{BB962C8B-B14F-4D97-AF65-F5344CB8AC3E}">
+        <p14:creationId xmlns:p14="http://schemas.microsoft.com/office/powerpoint/2010/main" val="3610520107"/>
+      </p:ext>
+    </p:extLst>
+  </p:cSld>
+  <p:clrMapOvr>
+    <a:masterClrMapping/>
+  </p:clrMapOvr>
+  <mc:AlternateContent xmlns:mc="http://schemas.openxmlformats.org/markup-compatibility/2006" xmlns:p14="http://schemas.microsoft.com/office/powerpoint/2010/main">
+    <mc:Choice Requires="p14">
+      <p:transition spd="med" p14:dur="700">
+        <p:fade/>
+      </p:transition>
+    </mc:Choice>
+    <mc:Fallback xmlns="">
+      <p:transition spd="med">
+        <p:fade/>
+      </p:transition>
+    </mc:Fallback>
+  </mc:AlternateContent>
+  <p:timing>
+    <p:tnLst>
+      <p:par>
+        <p:cTn xmlns:p14="http://schemas.microsoft.com/office/powerpoint/2010/main" id="1" dur="indefinite" restart="never" nodeType="tmRoot"/>
+      </p:par>
+    </p:tnLst>
+  </p:timing>
+</p:sld>
+</file>
+
+<file path=ppt/slides/slide11.xml><?xml version="1.0" encoding="utf-8"?>
+<p:sld xmlns:a="http://schemas.openxmlformats.org/drawingml/2006/main" xmlns:r="http://schemas.openxmlformats.org/officeDocument/2006/relationships" xmlns:p="http://schemas.openxmlformats.org/presentationml/2006/main">
+  <p:cSld>
+    <p:spTree>
+      <p:nvGrpSpPr>
+        <p:cNvPr id="1" name=""/>
+        <p:cNvGrpSpPr/>
+        <p:nvPr/>
+      </p:nvGrpSpPr>
+      <p:grpSpPr>
+        <a:xfrm>
+          <a:off x="0" y="0"/>
+          <a:ext cx="0" cy="0"/>
+          <a:chOff x="0" y="0"/>
+          <a:chExt cx="0" cy="0"/>
+        </a:xfrm>
+      </p:grpSpPr>
+      <p:sp>
+        <p:nvSpPr>
+          <p:cNvPr id="2" name="Title 1"/>
+          <p:cNvSpPr>
+            <a:spLocks noGrp="1"/>
+          </p:cNvSpPr>
+          <p:nvPr>
+            <p:ph type="title"/>
+          </p:nvPr>
+        </p:nvSpPr>
+        <p:spPr>
+          <a:xfrm>
+            <a:off x="841248" y="2819400"/>
+            <a:ext cx="9601200" cy="1838519"/>
+          </a:xfrm>
+        </p:spPr>
+        <p:txBody>
+          <a:bodyPr/>
+          <a:lstStyle/>
+          <a:p>
+            <a:r>
+              <a:rPr lang="en-US" dirty="0" smtClean="0">
+                <a:latin typeface="Helvetica"/>
+                <a:cs typeface="Helvetica"/>
+              </a:rPr>
+              <a:t>Bayesian Regression </a:t>
+            </a:r>
+            <a:r>
+              <a:rPr lang="en-US" dirty="0">
+                <a:latin typeface="Helvetica"/>
+                <a:cs typeface="Helvetica"/>
+              </a:rPr>
+              <a:t>Modeling</a:t>
+            </a:r>
+          </a:p>
+        </p:txBody>
+      </p:sp>
+      <p:sp>
+        <p:nvSpPr>
+          <p:cNvPr id="3" name="Text Placeholder 2"/>
+          <p:cNvSpPr>
+            <a:spLocks noGrp="1"/>
+          </p:cNvSpPr>
+          <p:nvPr>
+            <p:ph type="body" idx="1"/>
+          </p:nvPr>
+        </p:nvSpPr>
+        <p:spPr>
+          <a:xfrm>
+            <a:off x="841248" y="4800600"/>
+            <a:ext cx="9601200" cy="475488"/>
+          </a:xfrm>
+        </p:spPr>
+        <p:txBody>
+          <a:bodyPr/>
+          <a:lstStyle/>
+          <a:p>
+            <a:r>
+              <a:rPr lang="en-US" dirty="0" smtClean="0">
+                <a:latin typeface="Helvetica"/>
+                <a:cs typeface="Helvetica"/>
+              </a:rPr>
+              <a:t>A spatial analysis of crime data</a:t>
+            </a:r>
+            <a:endParaRPr lang="en-US" dirty="0">
+              <a:latin typeface="Helvetica"/>
+              <a:cs typeface="Helvetica"/>
+            </a:endParaRPr>
+          </a:p>
+        </p:txBody>
+      </p:sp>
+    </p:spTree>
+    <p:extLst>
+      <p:ext uri="{BB962C8B-B14F-4D97-AF65-F5344CB8AC3E}">
+        <p14:creationId xmlns:p14="http://schemas.microsoft.com/office/powerpoint/2010/main" val="1945622998"/>
+      </p:ext>
+    </p:extLst>
+  </p:cSld>
+  <p:clrMapOvr>
+    <a:masterClrMapping/>
+  </p:clrMapOvr>
+  <mc:AlternateContent xmlns:mc="http://schemas.openxmlformats.org/markup-compatibility/2006" xmlns:p14="http://schemas.microsoft.com/office/powerpoint/2010/main">
+    <mc:Choice Requires="p14">
+      <p:transition spd="med" p14:dur="700">
+        <p:fade/>
+      </p:transition>
+    </mc:Choice>
+    <mc:Fallback xmlns="">
+      <p:transition spd="med">
+        <p:fade/>
+      </p:transition>
+    </mc:Fallback>
+  </mc:AlternateContent>
+  <p:timing>
+    <p:tnLst>
+      <p:par>
+        <p:cTn xmlns:p14="http://schemas.microsoft.com/office/powerpoint/2010/main" id="1" dur="indefinite" restart="never" nodeType="tmRoot"/>
+      </p:par>
+    </p:tnLst>
+  </p:timing>
+</p:sld>
+</file>
+
+<file path=ppt/slides/slide12.xml><?xml version="1.0" encoding="utf-8"?>
+<p:sld xmlns:a="http://schemas.openxmlformats.org/drawingml/2006/main" xmlns:r="http://schemas.openxmlformats.org/officeDocument/2006/relationships" xmlns:p="http://schemas.openxmlformats.org/presentationml/2006/main">
+  <p:cSld>
+    <p:bg>
+      <p:bgPr>
+        <a:solidFill>
+          <a:schemeClr val="tx1"/>
+        </a:solidFill>
+        <a:effectLst/>
+      </p:bgPr>
+    </p:bg>
+    <p:spTree>
+      <p:nvGrpSpPr>
+        <p:cNvPr id="1" name=""/>
+        <p:cNvGrpSpPr/>
+        <p:nvPr/>
+      </p:nvGrpSpPr>
+      <p:grpSpPr>
+        <a:xfrm>
+          <a:off x="0" y="0"/>
+          <a:ext cx="0" cy="0"/>
+          <a:chOff x="0" y="0"/>
+          <a:chExt cx="0" cy="0"/>
+        </a:xfrm>
+      </p:grpSpPr>
+      <p:sp>
+        <p:nvSpPr>
+          <p:cNvPr id="2" name="Title 1"/>
+          <p:cNvSpPr>
+            <a:spLocks noGrp="1"/>
+          </p:cNvSpPr>
+          <p:nvPr>
+            <p:ph type="title"/>
+          </p:nvPr>
+        </p:nvSpPr>
+        <p:spPr>
+          <a:xfrm>
+            <a:off x="838200" y="-76200"/>
+            <a:ext cx="10515600" cy="1145224"/>
+          </a:xfrm>
+        </p:spPr>
+        <p:txBody>
+          <a:bodyPr/>
+          <a:lstStyle/>
+          <a:p>
+            <a:r>
+              <a:rPr lang="en-US" dirty="0" smtClean="0">
+                <a:solidFill>
+                  <a:schemeClr val="accent6">
+                    <a:lumMod val="75000"/>
+                  </a:schemeClr>
+                </a:solidFill>
+                <a:latin typeface="Helvetica"/>
+                <a:cs typeface="Helvetica"/>
+              </a:rPr>
+              <a:t>LASSO Regression Model</a:t>
+            </a:r>
+            <a:endParaRPr lang="en-US" dirty="0">
+              <a:solidFill>
+                <a:schemeClr val="accent6">
+                  <a:lumMod val="75000"/>
+                </a:schemeClr>
+              </a:solidFill>
+              <a:latin typeface="Helvetica"/>
+              <a:cs typeface="Helvetica"/>
+            </a:endParaRPr>
+          </a:p>
+        </p:txBody>
+      </p:sp>
+      <p:pic>
+        <p:nvPicPr>
+          <p:cNvPr id="8" name="Picture 7"/>
+          <p:cNvPicPr>
+            <a:picLocks noChangeAspect="1"/>
+          </p:cNvPicPr>
+          <p:nvPr/>
+        </p:nvPicPr>
+        <p:blipFill>
+          <a:blip r:embed="rId2"/>
+          <a:stretch>
+            <a:fillRect/>
+          </a:stretch>
+        </p:blipFill>
+        <p:spPr>
+          <a:xfrm>
+            <a:off x="762000" y="1391105"/>
+            <a:ext cx="10820400" cy="4857295"/>
+          </a:xfrm>
+          <a:prstGeom prst="rect">
+            <a:avLst/>
+          </a:prstGeom>
+        </p:spPr>
+      </p:pic>
+    </p:spTree>
+    <p:extLst>
+      <p:ext uri="{BB962C8B-B14F-4D97-AF65-F5344CB8AC3E}">
+        <p14:creationId xmlns:p14="http://schemas.microsoft.com/office/powerpoint/2010/main" val="1159850092"/>
+      </p:ext>
+    </p:extLst>
+  </p:cSld>
+  <p:clrMapOvr>
+    <a:masterClrMapping/>
+  </p:clrMapOvr>
+  <mc:AlternateContent xmlns:mc="http://schemas.openxmlformats.org/markup-compatibility/2006" xmlns:p14="http://schemas.microsoft.com/office/powerpoint/2010/main">
+    <mc:Choice Requires="p14">
+      <p:transition spd="med" p14:dur="700">
+        <p:fade/>
+      </p:transition>
+    </mc:Choice>
+    <mc:Fallback xmlns="">
+      <p:transition spd="med">
+        <p:fade/>
+      </p:transition>
+    </mc:Fallback>
+  </mc:AlternateContent>
+  <p:timing>
+    <p:tnLst>
+      <p:par>
+        <p:cTn xmlns:p14="http://schemas.microsoft.com/office/powerpoint/2010/main" id="1" dur="indefinite" restart="never" nodeType="tmRoot"/>
+      </p:par>
+    </p:tnLst>
+  </p:timing>
+</p:sld>
+</file>
+
+<file path=ppt/slides/slide13.xml><?xml version="1.0" encoding="utf-8"?>
+<p:sld xmlns:a="http://schemas.openxmlformats.org/drawingml/2006/main" xmlns:r="http://schemas.openxmlformats.org/officeDocument/2006/relationships" xmlns:p="http://schemas.openxmlformats.org/presentationml/2006/main">
+  <p:cSld>
+    <p:bg>
+      <p:bgPr>
+        <a:solidFill>
+          <a:schemeClr val="tx1"/>
+        </a:solidFill>
+        <a:effectLst/>
+      </p:bgPr>
+    </p:bg>
+    <p:spTree>
+      <p:nvGrpSpPr>
+        <p:cNvPr id="1" name=""/>
+        <p:cNvGrpSpPr/>
+        <p:nvPr/>
+      </p:nvGrpSpPr>
+      <p:grpSpPr>
+        <a:xfrm>
+          <a:off x="0" y="0"/>
+          <a:ext cx="0" cy="0"/>
+          <a:chOff x="0" y="0"/>
+          <a:chExt cx="0" cy="0"/>
+        </a:xfrm>
+      </p:grpSpPr>
+      <p:sp>
+        <p:nvSpPr>
           <p:cNvPr id="2" name="Title 1"/>
           <p:cNvSpPr>
             <a:spLocks noGrp="1"/>
@@ -7320,12 +7747,27 @@
       </p:transition>
     </mc:Fallback>
   </mc:AlternateContent>
+  <p:timing>
+    <p:tnLst>
+      <p:par>
+        <p:cTn xmlns:p14="http://schemas.microsoft.com/office/powerpoint/2010/main" id="1" dur="indefinite" restart="never" nodeType="tmRoot"/>
+      </p:par>
+    </p:tnLst>
+  </p:timing>
 </p:sld>
 </file>
 
-<file path=ppt/slides/slide11.xml><?xml version="1.0" encoding="utf-8"?>
+<file path=ppt/slides/slide14.xml><?xml version="1.0" encoding="utf-8"?>
 <p:sld xmlns:a="http://schemas.openxmlformats.org/drawingml/2006/main" xmlns:r="http://schemas.openxmlformats.org/officeDocument/2006/relationships" xmlns:p="http://schemas.openxmlformats.org/presentationml/2006/main">
   <p:cSld>
+    <p:bg>
+      <p:bgPr>
+        <a:solidFill>
+          <a:schemeClr val="tx1"/>
+        </a:solidFill>
+        <a:effectLst/>
+      </p:bgPr>
+    </p:bg>
     <p:spTree>
       <p:nvGrpSpPr>
         <p:cNvPr id="1" name=""/>
@@ -7340,40 +7782,6 @@
           <a:chExt cx="0" cy="0"/>
         </a:xfrm>
       </p:grpSpPr>
-      <p:sp>
-        <p:nvSpPr>
-          <p:cNvPr id="2" name="Title 1"/>
-          <p:cNvSpPr>
-            <a:spLocks noGrp="1"/>
-          </p:cNvSpPr>
-          <p:nvPr>
-            <p:ph type="title"/>
-          </p:nvPr>
-        </p:nvSpPr>
-        <p:spPr>
-          <a:xfrm>
-            <a:off x="838200" y="-76200"/>
-            <a:ext cx="10515600" cy="1145224"/>
-          </a:xfrm>
-        </p:spPr>
-        <p:txBody>
-          <a:bodyPr/>
-          <a:lstStyle/>
-          <a:p>
-            <a:r>
-              <a:rPr lang="en-US" dirty="0" smtClean="0">
-                <a:latin typeface="Helvetica"/>
-                <a:cs typeface="Helvetica"/>
-              </a:rPr>
-              <a:t>Results</a:t>
-            </a:r>
-            <a:endParaRPr lang="en-US" dirty="0">
-              <a:latin typeface="Helvetica"/>
-              <a:cs typeface="Helvetica"/>
-            </a:endParaRPr>
-          </a:p>
-        </p:txBody>
-      </p:sp>
       <p:pic>
         <p:nvPicPr>
           <p:cNvPr id="8" name="Picture 7"/>
@@ -7398,6 +7806,46 @@
           </a:prstGeom>
         </p:spPr>
       </p:pic>
+      <p:sp>
+        <p:nvSpPr>
+          <p:cNvPr id="5" name="Title 1"/>
+          <p:cNvSpPr>
+            <a:spLocks noGrp="1"/>
+          </p:cNvSpPr>
+          <p:nvPr>
+            <p:ph type="title"/>
+          </p:nvPr>
+        </p:nvSpPr>
+        <p:spPr>
+          <a:xfrm>
+            <a:off x="381000" y="-76200"/>
+            <a:ext cx="10515600" cy="1145224"/>
+          </a:xfrm>
+        </p:spPr>
+        <p:txBody>
+          <a:bodyPr/>
+          <a:lstStyle/>
+          <a:p>
+            <a:r>
+              <a:rPr lang="en-US" dirty="0" smtClean="0">
+                <a:solidFill>
+                  <a:srgbClr val="736756"/>
+                </a:solidFill>
+                <a:latin typeface="Helvetica"/>
+                <a:cs typeface="Helvetica"/>
+              </a:rPr>
+              <a:t>Results</a:t>
+            </a:r>
+            <a:endParaRPr lang="en-US" dirty="0">
+              <a:solidFill>
+                <a:srgbClr val="736756"/>
+              </a:solidFill>
+              <a:latin typeface="Helvetica"/>
+              <a:cs typeface="Helvetica"/>
+            </a:endParaRPr>
+          </a:p>
+        </p:txBody>
+      </p:sp>
     </p:spTree>
     <p:extLst>
       <p:ext uri="{BB962C8B-B14F-4D97-AF65-F5344CB8AC3E}">
@@ -7420,10 +7868,17 @@
       </p:transition>
     </mc:Fallback>
   </mc:AlternateContent>
+  <p:timing>
+    <p:tnLst>
+      <p:par>
+        <p:cTn xmlns:p14="http://schemas.microsoft.com/office/powerpoint/2010/main" id="1" dur="indefinite" restart="never" nodeType="tmRoot"/>
+      </p:par>
+    </p:tnLst>
+  </p:timing>
 </p:sld>
 </file>
 
-<file path=ppt/slides/slide12.xml><?xml version="1.0" encoding="utf-8"?>
+<file path=ppt/slides/slide15.xml><?xml version="1.0" encoding="utf-8"?>
 <p:sld xmlns:a="http://schemas.openxmlformats.org/drawingml/2006/main" xmlns:r="http://schemas.openxmlformats.org/officeDocument/2006/relationships" xmlns:p="http://schemas.openxmlformats.org/presentationml/2006/main">
   <p:cSld>
     <p:bg>
@@ -7824,10 +8279,184 @@
       </p:transition>
     </mc:Fallback>
   </mc:AlternateContent>
+  <p:timing>
+    <p:tnLst>
+      <p:par>
+        <p:cTn xmlns:p14="http://schemas.microsoft.com/office/powerpoint/2010/main" id="1" dur="indefinite" restart="never" nodeType="tmRoot"/>
+      </p:par>
+    </p:tnLst>
+  </p:timing>
 </p:sld>
 </file>
 
-<file path=ppt/slides/slide13.xml><?xml version="1.0" encoding="utf-8"?>
+<file path=ppt/slides/slide16.xml><?xml version="1.0" encoding="utf-8"?>
+<p:sld xmlns:a="http://schemas.openxmlformats.org/drawingml/2006/main" xmlns:r="http://schemas.openxmlformats.org/officeDocument/2006/relationships" xmlns:p="http://schemas.openxmlformats.org/presentationml/2006/main">
+  <p:cSld>
+    <p:bg>
+      <p:bgPr>
+        <a:solidFill>
+          <a:schemeClr val="tx1"/>
+        </a:solidFill>
+        <a:effectLst/>
+      </p:bgPr>
+    </p:bg>
+    <p:spTree>
+      <p:nvGrpSpPr>
+        <p:cNvPr id="1" name=""/>
+        <p:cNvGrpSpPr/>
+        <p:nvPr/>
+      </p:nvGrpSpPr>
+      <p:grpSpPr>
+        <a:xfrm>
+          <a:off x="0" y="0"/>
+          <a:ext cx="0" cy="0"/>
+          <a:chOff x="0" y="0"/>
+          <a:chExt cx="0" cy="0"/>
+        </a:xfrm>
+      </p:grpSpPr>
+      <p:sp>
+        <p:nvSpPr>
+          <p:cNvPr id="3" name="Content Placeholder 2"/>
+          <p:cNvSpPr>
+            <a:spLocks noGrp="1"/>
+          </p:cNvSpPr>
+          <p:nvPr>
+            <p:ph idx="1"/>
+          </p:nvPr>
+        </p:nvSpPr>
+        <p:spPr>
+          <a:xfrm>
+            <a:off x="381000" y="1600200"/>
+            <a:ext cx="10972800" cy="4576763"/>
+          </a:xfrm>
+        </p:spPr>
+        <p:txBody>
+          <a:bodyPr>
+            <a:normAutofit/>
+          </a:bodyPr>
+          <a:lstStyle/>
+          <a:p>
+            <a:r>
+              <a:rPr lang="en-US" sz="2400" dirty="0" smtClean="0">
+                <a:solidFill>
+                  <a:srgbClr val="736756"/>
+                </a:solidFill>
+                <a:latin typeface="Helvetica"/>
+                <a:cs typeface="Helvetica"/>
+              </a:rPr>
+              <a:t>Temporal trends similar across city “sides”</a:t>
+            </a:r>
+          </a:p>
+          <a:p>
+            <a:pPr lvl="1"/>
+            <a:r>
+              <a:rPr lang="en-US" sz="2200" dirty="0" smtClean="0">
+                <a:solidFill>
+                  <a:srgbClr val="736756"/>
+                </a:solidFill>
+                <a:latin typeface="Helvetica"/>
+                <a:cs typeface="Helvetica"/>
+              </a:rPr>
+              <a:t>Strong yearly and autoregressive trends</a:t>
+            </a:r>
+            <a:endParaRPr lang="en-US" sz="2200" dirty="0" smtClean="0">
+              <a:solidFill>
+                <a:schemeClr val="bg2">
+                  <a:lumMod val="65000"/>
+                  <a:lumOff val="35000"/>
+                </a:schemeClr>
+              </a:solidFill>
+              <a:latin typeface="Helvetica"/>
+              <a:cs typeface="Helvetica"/>
+            </a:endParaRPr>
+          </a:p>
+          <a:p>
+            <a:endParaRPr lang="en-US" sz="2400" dirty="0">
+              <a:solidFill>
+                <a:schemeClr val="bg2">
+                  <a:lumMod val="65000"/>
+                  <a:lumOff val="35000"/>
+                </a:schemeClr>
+              </a:solidFill>
+              <a:latin typeface="Helvetica"/>
+              <a:cs typeface="Helvetica"/>
+            </a:endParaRPr>
+          </a:p>
+        </p:txBody>
+      </p:sp>
+      <p:sp>
+        <p:nvSpPr>
+          <p:cNvPr id="4" name="Title 1"/>
+          <p:cNvSpPr>
+            <a:spLocks noGrp="1"/>
+          </p:cNvSpPr>
+          <p:nvPr>
+            <p:ph type="title"/>
+          </p:nvPr>
+        </p:nvSpPr>
+        <p:spPr>
+          <a:xfrm>
+            <a:off x="381000" y="-76200"/>
+            <a:ext cx="10515600" cy="1145224"/>
+          </a:xfrm>
+        </p:spPr>
+        <p:txBody>
+          <a:bodyPr/>
+          <a:lstStyle/>
+          <a:p>
+            <a:r>
+              <a:rPr lang="en-US" dirty="0" smtClean="0">
+                <a:solidFill>
+                  <a:srgbClr val="736756"/>
+                </a:solidFill>
+                <a:latin typeface="Helvetica"/>
+                <a:cs typeface="Helvetica"/>
+              </a:rPr>
+              <a:t>Conclusions</a:t>
+            </a:r>
+            <a:endParaRPr lang="en-US" dirty="0">
+              <a:solidFill>
+                <a:srgbClr val="736756"/>
+              </a:solidFill>
+              <a:latin typeface="Helvetica"/>
+              <a:cs typeface="Helvetica"/>
+            </a:endParaRPr>
+          </a:p>
+        </p:txBody>
+      </p:sp>
+    </p:spTree>
+    <p:extLst>
+      <p:ext uri="{BB962C8B-B14F-4D97-AF65-F5344CB8AC3E}">
+        <p14:creationId xmlns:p14="http://schemas.microsoft.com/office/powerpoint/2010/main" val="421549997"/>
+      </p:ext>
+    </p:extLst>
+  </p:cSld>
+  <p:clrMapOvr>
+    <a:masterClrMapping/>
+  </p:clrMapOvr>
+  <mc:AlternateContent xmlns:mc="http://schemas.openxmlformats.org/markup-compatibility/2006" xmlns:p14="http://schemas.microsoft.com/office/powerpoint/2010/main">
+    <mc:Choice Requires="p14">
+      <p:transition spd="med" p14:dur="700">
+        <p:fade/>
+      </p:transition>
+    </mc:Choice>
+    <mc:Fallback xmlns="">
+      <p:transition spd="med">
+        <p:fade/>
+      </p:transition>
+    </mc:Fallback>
+  </mc:AlternateContent>
+  <p:timing>
+    <p:tnLst>
+      <p:par>
+        <p:cTn xmlns:p14="http://schemas.microsoft.com/office/powerpoint/2010/main" id="1" dur="indefinite" restart="never" nodeType="tmRoot"/>
+      </p:par>
+    </p:tnLst>
+  </p:timing>
+</p:sld>
+</file>
+
+<file path=ppt/slides/slide17.xml><?xml version="1.0" encoding="utf-8"?>
 <p:sld xmlns:a="http://schemas.openxmlformats.org/drawingml/2006/main" xmlns:r="http://schemas.openxmlformats.org/officeDocument/2006/relationships" xmlns:p="http://schemas.openxmlformats.org/presentationml/2006/main">
   <p:cSld>
     <p:spTree>
@@ -7969,12 +8598,27 @@
       </p:transition>
     </mc:Fallback>
   </mc:AlternateContent>
+  <p:timing>
+    <p:tnLst>
+      <p:par>
+        <p:cTn xmlns:p14="http://schemas.microsoft.com/office/powerpoint/2010/main" id="1" dur="indefinite" restart="never" nodeType="tmRoot"/>
+      </p:par>
+    </p:tnLst>
+  </p:timing>
 </p:sld>
 </file>
 
 <file path=ppt/slides/slide2.xml><?xml version="1.0" encoding="utf-8"?>
 <p:sld xmlns:a="http://schemas.openxmlformats.org/drawingml/2006/main" xmlns:r="http://schemas.openxmlformats.org/officeDocument/2006/relationships" xmlns:p="http://schemas.openxmlformats.org/presentationml/2006/main">
   <p:cSld>
+    <p:bg>
+      <p:bgPr>
+        <a:solidFill>
+          <a:schemeClr val="tx1"/>
+        </a:solidFill>
+        <a:effectLst/>
+      </p:bgPr>
+    </p:bg>
     <p:spTree>
       <p:nvGrpSpPr>
         <p:cNvPr id="1" name=""/>
@@ -7989,36 +8633,6 @@
           <a:chExt cx="0" cy="0"/>
         </a:xfrm>
       </p:grpSpPr>
-      <p:sp>
-        <p:nvSpPr>
-          <p:cNvPr id="2" name="Title 1"/>
-          <p:cNvSpPr>
-            <a:spLocks noGrp="1"/>
-          </p:cNvSpPr>
-          <p:nvPr>
-            <p:ph type="title"/>
-          </p:nvPr>
-        </p:nvSpPr>
-        <p:spPr>
-          <a:xfrm>
-            <a:off x="457200" y="0"/>
-            <a:ext cx="10515600" cy="1145224"/>
-          </a:xfrm>
-        </p:spPr>
-        <p:txBody>
-          <a:bodyPr/>
-          <a:lstStyle/>
-          <a:p>
-            <a:r>
-              <a:rPr lang="en-US" dirty="0">
-                <a:latin typeface="Helvetica"/>
-                <a:cs typeface="Helvetica"/>
-              </a:rPr>
-              <a:t>Is Chicago a war zone?</a:t>
-            </a:r>
-          </a:p>
-        </p:txBody>
-      </p:sp>
       <p:pic>
         <p:nvPicPr>
           <p:cNvPr id="3074" name="Picture 2" descr="https://tribwgntv.files.wordpress.com/2017/01/twwet.png"/>
@@ -8143,6 +8757,50 @@
           </a:extLst>
         </p:spPr>
       </p:pic>
+      <p:sp>
+        <p:nvSpPr>
+          <p:cNvPr id="7" name="Title 1"/>
+          <p:cNvSpPr>
+            <a:spLocks noGrp="1"/>
+          </p:cNvSpPr>
+          <p:nvPr>
+            <p:ph type="title"/>
+          </p:nvPr>
+        </p:nvSpPr>
+        <p:spPr>
+          <a:xfrm>
+            <a:off x="838200" y="-76200"/>
+            <a:ext cx="10515600" cy="1145224"/>
+          </a:xfrm>
+        </p:spPr>
+        <p:txBody>
+          <a:bodyPr/>
+          <a:lstStyle/>
+          <a:p>
+            <a:r>
+              <a:rPr lang="en-US" dirty="0" smtClean="0">
+                <a:solidFill>
+                  <a:schemeClr val="accent6">
+                    <a:lumMod val="75000"/>
+                  </a:schemeClr>
+                </a:solidFill>
+                <a:latin typeface="Helvetica"/>
+                <a:cs typeface="Helvetica"/>
+              </a:rPr>
+              <a:t>Is Chicago a War Zone?</a:t>
+            </a:r>
+            <a:endParaRPr lang="en-US" dirty="0">
+              <a:solidFill>
+                <a:schemeClr val="accent6">
+                  <a:lumMod val="75000"/>
+                </a:schemeClr>
+              </a:solidFill>
+              <a:latin typeface="Helvetica"/>
+              <a:cs typeface="Helvetica"/>
+            </a:endParaRPr>
+          </a:p>
+        </p:txBody>
+      </p:sp>
     </p:spTree>
     <p:extLst>
       <p:ext uri="{BB962C8B-B14F-4D97-AF65-F5344CB8AC3E}">
@@ -8165,12 +8823,27 @@
       </p:transition>
     </mc:Fallback>
   </mc:AlternateContent>
+  <p:timing>
+    <p:tnLst>
+      <p:par>
+        <p:cTn xmlns:p14="http://schemas.microsoft.com/office/powerpoint/2010/main" id="1" dur="indefinite" restart="never" nodeType="tmRoot"/>
+      </p:par>
+    </p:tnLst>
+  </p:timing>
 </p:sld>
 </file>
 
 <file path=ppt/slides/slide3.xml><?xml version="1.0" encoding="utf-8"?>
 <p:sld xmlns:a="http://schemas.openxmlformats.org/drawingml/2006/main" xmlns:r="http://schemas.openxmlformats.org/officeDocument/2006/relationships" xmlns:p="http://schemas.openxmlformats.org/presentationml/2006/main">
   <p:cSld>
+    <p:bg>
+      <p:bgPr>
+        <a:solidFill>
+          <a:schemeClr val="tx1"/>
+        </a:solidFill>
+        <a:effectLst/>
+      </p:bgPr>
+    </p:bg>
     <p:spTree>
       <p:nvGrpSpPr>
         <p:cNvPr id="1" name=""/>
@@ -8185,36 +8858,6 @@
           <a:chExt cx="0" cy="0"/>
         </a:xfrm>
       </p:grpSpPr>
-      <p:sp>
-        <p:nvSpPr>
-          <p:cNvPr id="2" name="Title 1"/>
-          <p:cNvSpPr>
-            <a:spLocks noGrp="1"/>
-          </p:cNvSpPr>
-          <p:nvPr>
-            <p:ph type="title"/>
-          </p:nvPr>
-        </p:nvSpPr>
-        <p:spPr>
-          <a:xfrm>
-            <a:off x="838200" y="-76200"/>
-            <a:ext cx="10515600" cy="1145224"/>
-          </a:xfrm>
-        </p:spPr>
-        <p:txBody>
-          <a:bodyPr/>
-          <a:lstStyle/>
-          <a:p>
-            <a:r>
-              <a:rPr lang="en-US" dirty="0">
-                <a:latin typeface="Helvetica"/>
-                <a:cs typeface="Helvetica"/>
-              </a:rPr>
-              <a:t>Data Sources</a:t>
-            </a:r>
-          </a:p>
-        </p:txBody>
-      </p:sp>
       <p:pic>
         <p:nvPicPr>
           <p:cNvPr id="6" name="Picture 5"/>
@@ -8239,6 +8882,50 @@
           </a:prstGeom>
         </p:spPr>
       </p:pic>
+      <p:sp>
+        <p:nvSpPr>
+          <p:cNvPr id="5" name="Title 1"/>
+          <p:cNvSpPr>
+            <a:spLocks noGrp="1"/>
+          </p:cNvSpPr>
+          <p:nvPr>
+            <p:ph type="title"/>
+          </p:nvPr>
+        </p:nvSpPr>
+        <p:spPr>
+          <a:xfrm>
+            <a:off x="838200" y="-76200"/>
+            <a:ext cx="10515600" cy="1145224"/>
+          </a:xfrm>
+        </p:spPr>
+        <p:txBody>
+          <a:bodyPr/>
+          <a:lstStyle/>
+          <a:p>
+            <a:r>
+              <a:rPr lang="en-US" dirty="0" smtClean="0">
+                <a:solidFill>
+                  <a:schemeClr val="accent6">
+                    <a:lumMod val="75000"/>
+                  </a:schemeClr>
+                </a:solidFill>
+                <a:latin typeface="Helvetica"/>
+                <a:cs typeface="Helvetica"/>
+              </a:rPr>
+              <a:t>Data Sources</a:t>
+            </a:r>
+            <a:endParaRPr lang="en-US" dirty="0">
+              <a:solidFill>
+                <a:schemeClr val="accent6">
+                  <a:lumMod val="75000"/>
+                </a:schemeClr>
+              </a:solidFill>
+              <a:latin typeface="Helvetica"/>
+              <a:cs typeface="Helvetica"/>
+            </a:endParaRPr>
+          </a:p>
+        </p:txBody>
+      </p:sp>
     </p:spTree>
     <p:extLst>
       <p:ext uri="{BB962C8B-B14F-4D97-AF65-F5344CB8AC3E}">
@@ -8261,6 +8948,13 @@
       </p:transition>
     </mc:Fallback>
   </mc:AlternateContent>
+  <p:timing>
+    <p:tnLst>
+      <p:par>
+        <p:cTn xmlns:p14="http://schemas.microsoft.com/office/powerpoint/2010/main" id="1" dur="indefinite" restart="never" nodeType="tmRoot"/>
+      </p:par>
+    </p:tnLst>
+  </p:timing>
 </p:sld>
 </file>
 
@@ -8293,7 +8987,7 @@
         </p:nvSpPr>
         <p:spPr>
           <a:xfrm>
-            <a:off x="838200" y="365126"/>
+            <a:off x="838200" y="73976"/>
             <a:ext cx="10515600" cy="1145224"/>
           </a:xfrm>
         </p:spPr>
@@ -8402,6 +9096,13 @@
       </p:transition>
     </mc:Fallback>
   </mc:AlternateContent>
+  <p:timing>
+    <p:tnLst>
+      <p:par>
+        <p:cTn xmlns:p14="http://schemas.microsoft.com/office/powerpoint/2010/main" id="1" dur="indefinite" restart="never" nodeType="tmRoot"/>
+      </p:par>
+    </p:tnLst>
+  </p:timing>
 </p:sld>
 </file>
 
@@ -8508,12 +9209,27 @@
       </p:transition>
     </mc:Fallback>
   </mc:AlternateContent>
+  <p:timing>
+    <p:tnLst>
+      <p:par>
+        <p:cTn xmlns:p14="http://schemas.microsoft.com/office/powerpoint/2010/main" id="1" dur="indefinite" restart="never" nodeType="tmRoot"/>
+      </p:par>
+    </p:tnLst>
+  </p:timing>
 </p:sld>
 </file>
 
 <file path=ppt/slides/slide6.xml><?xml version="1.0" encoding="utf-8"?>
 <p:sld xmlns:a="http://schemas.openxmlformats.org/drawingml/2006/main" xmlns:r="http://schemas.openxmlformats.org/officeDocument/2006/relationships" xmlns:p="http://schemas.openxmlformats.org/presentationml/2006/main">
   <p:cSld>
+    <p:bg>
+      <p:bgPr>
+        <a:solidFill>
+          <a:schemeClr val="tx1"/>
+        </a:solidFill>
+        <a:effectLst/>
+      </p:bgPr>
+    </p:bg>
     <p:spTree>
       <p:nvGrpSpPr>
         <p:cNvPr id="1" name=""/>
@@ -8530,9 +9246,9 @@
       </p:grpSpPr>
       <p:pic>
         <p:nvPicPr>
-          <p:cNvPr id="1026" name="Picture 2" descr="https://upload.wikimedia.org/wikipedia/commons/thumb/2/24/Map_of_the_Community_Areas_and_%27Sides%27_of_the_City_of_Chicago.svg/350px-Map_of_the_Community_Areas_and_%27Sides%27_of_the_City_of_Chicago.svg.png"/>
+          <p:cNvPr id="4" name="Picture 3" descr="side.png"/>
           <p:cNvPicPr>
-            <a:picLocks noChangeAspect="1" noChangeArrowheads="1"/>
+            <a:picLocks noChangeAspect="1"/>
           </p:cNvPicPr>
           <p:nvPr/>
         </p:nvPicPr>
@@ -8544,28 +9260,68 @@
               </a:ext>
             </a:extLst>
           </a:blip>
-          <a:srcRect/>
           <a:stretch>
             <a:fillRect/>
           </a:stretch>
         </p:blipFill>
-        <p:spPr bwMode="auto">
-          <a:xfrm>
-            <a:off x="1295400" y="674424"/>
-            <a:ext cx="4343400" cy="5621601"/>
+        <p:spPr>
+          <a:xfrm>
+            <a:off x="2819400" y="1143000"/>
+            <a:ext cx="6562725" cy="5214930"/>
           </a:xfrm>
           <a:prstGeom prst="rect">
             <a:avLst/>
           </a:prstGeom>
-          <a:solidFill>
-            <a:schemeClr val="accent1"/>
-          </a:solidFill>
         </p:spPr>
       </p:pic>
+      <p:sp>
+        <p:nvSpPr>
+          <p:cNvPr id="6" name="Title 1"/>
+          <p:cNvSpPr>
+            <a:spLocks noGrp="1"/>
+          </p:cNvSpPr>
+          <p:nvPr>
+            <p:ph type="title"/>
+          </p:nvPr>
+        </p:nvSpPr>
+        <p:spPr>
+          <a:xfrm>
+            <a:off x="838200" y="-76200"/>
+            <a:ext cx="10515600" cy="1145224"/>
+          </a:xfrm>
+        </p:spPr>
+        <p:txBody>
+          <a:bodyPr/>
+          <a:lstStyle/>
+          <a:p>
+            <a:r>
+              <a:rPr lang="en-US" dirty="0" smtClean="0">
+                <a:solidFill>
+                  <a:schemeClr val="accent6">
+                    <a:lumMod val="75000"/>
+                  </a:schemeClr>
+                </a:solidFill>
+                <a:latin typeface="Helvetica"/>
+                <a:cs typeface="Helvetica"/>
+              </a:rPr>
+              <a:t>“Sides” of Chicago</a:t>
+            </a:r>
+            <a:endParaRPr lang="en-US" dirty="0">
+              <a:solidFill>
+                <a:schemeClr val="accent6">
+                  <a:lumMod val="75000"/>
+                </a:schemeClr>
+              </a:solidFill>
+              <a:latin typeface="Helvetica"/>
+              <a:cs typeface="Helvetica"/>
+            </a:endParaRPr>
+          </a:p>
+        </p:txBody>
+      </p:sp>
     </p:spTree>
     <p:extLst>
       <p:ext uri="{BB962C8B-B14F-4D97-AF65-F5344CB8AC3E}">
-        <p14:creationId xmlns:p14="http://schemas.microsoft.com/office/powerpoint/2010/main" val="1841336679"/>
+        <p14:creationId xmlns:p14="http://schemas.microsoft.com/office/powerpoint/2010/main" val="1206484074"/>
       </p:ext>
     </p:extLst>
   </p:cSld>
@@ -8584,12 +9340,27 @@
       </p:transition>
     </mc:Fallback>
   </mc:AlternateContent>
+  <p:timing>
+    <p:tnLst>
+      <p:par>
+        <p:cTn xmlns:p14="http://schemas.microsoft.com/office/powerpoint/2010/main" id="1" dur="indefinite" restart="never" nodeType="tmRoot"/>
+      </p:par>
+    </p:tnLst>
+  </p:timing>
 </p:sld>
 </file>
 
 <file path=ppt/slides/slide7.xml><?xml version="1.0" encoding="utf-8"?>
 <p:sld xmlns:a="http://schemas.openxmlformats.org/drawingml/2006/main" xmlns:r="http://schemas.openxmlformats.org/officeDocument/2006/relationships" xmlns:p="http://schemas.openxmlformats.org/presentationml/2006/main">
   <p:cSld>
+    <p:bg>
+      <p:bgPr>
+        <a:solidFill>
+          <a:schemeClr val="tx1"/>
+        </a:solidFill>
+        <a:effectLst/>
+      </p:bgPr>
+    </p:bg>
     <p:spTree>
       <p:nvGrpSpPr>
         <p:cNvPr id="1" name=""/>
@@ -8604,9 +9375,69 @@
           <a:chExt cx="0" cy="0"/>
         </a:xfrm>
       </p:grpSpPr>
-      <p:sp>
-        <p:nvSpPr>
-          <p:cNvPr id="2" name="Title 1"/>
+      <p:pic>
+        <p:nvPicPr>
+          <p:cNvPr id="3" name="Picture 2" descr="counts_by_pop.png"/>
+          <p:cNvPicPr>
+            <a:picLocks noChangeAspect="1"/>
+          </p:cNvPicPr>
+          <p:nvPr/>
+        </p:nvPicPr>
+        <p:blipFill>
+          <a:blip r:embed="rId2">
+            <a:extLst>
+              <a:ext uri="{28A0092B-C50C-407E-A947-70E740481C1C}">
+                <a14:useLocalDpi xmlns:a14="http://schemas.microsoft.com/office/drawing/2010/main" val="0"/>
+              </a:ext>
+            </a:extLst>
+          </a:blip>
+          <a:stretch>
+            <a:fillRect/>
+          </a:stretch>
+        </p:blipFill>
+        <p:spPr>
+          <a:xfrm>
+            <a:off x="6162675" y="1219200"/>
+            <a:ext cx="6029325" cy="4791075"/>
+          </a:xfrm>
+          <a:prstGeom prst="rect">
+            <a:avLst/>
+          </a:prstGeom>
+        </p:spPr>
+      </p:pic>
+      <p:pic>
+        <p:nvPicPr>
+          <p:cNvPr id="5" name="Picture 4" descr="population.png"/>
+          <p:cNvPicPr>
+            <a:picLocks noChangeAspect="1"/>
+          </p:cNvPicPr>
+          <p:nvPr/>
+        </p:nvPicPr>
+        <p:blipFill>
+          <a:blip r:embed="rId3">
+            <a:extLst>
+              <a:ext uri="{28A0092B-C50C-407E-A947-70E740481C1C}">
+                <a14:useLocalDpi xmlns:a14="http://schemas.microsoft.com/office/drawing/2010/main" val="0"/>
+              </a:ext>
+            </a:extLst>
+          </a:blip>
+          <a:stretch>
+            <a:fillRect/>
+          </a:stretch>
+        </p:blipFill>
+        <p:spPr>
+          <a:xfrm>
+            <a:off x="152400" y="1219200"/>
+            <a:ext cx="6029325" cy="4791075"/>
+          </a:xfrm>
+          <a:prstGeom prst="rect">
+            <a:avLst/>
+          </a:prstGeom>
+        </p:spPr>
+      </p:pic>
+      <p:sp>
+        <p:nvSpPr>
+          <p:cNvPr id="7" name="Title 1"/>
           <p:cNvSpPr>
             <a:spLocks noGrp="1"/>
           </p:cNvSpPr>
@@ -8616,7 +9447,7 @@
         </p:nvSpPr>
         <p:spPr>
           <a:xfrm>
-            <a:off x="838200" y="365126"/>
+            <a:off x="838200" y="-76200"/>
             <a:ext cx="10515600" cy="1145224"/>
           </a:xfrm>
         </p:spPr>
@@ -8625,88 +9456,33 @@
           <a:lstStyle/>
           <a:p>
             <a:r>
-              <a:rPr lang="en-US" dirty="0">
+              <a:rPr lang="en-US" dirty="0" smtClean="0">
+                <a:solidFill>
+                  <a:schemeClr val="accent6">
+                    <a:lumMod val="75000"/>
+                  </a:schemeClr>
+                </a:solidFill>
                 <a:latin typeface="Helvetica"/>
                 <a:cs typeface="Helvetica"/>
               </a:rPr>
-              <a:t>Images</a:t>
-            </a:r>
-          </a:p>
-        </p:txBody>
-      </p:sp>
-      <p:sp>
-        <p:nvSpPr>
-          <p:cNvPr id="3" name="Content Placeholder 2"/>
-          <p:cNvSpPr>
-            <a:spLocks noGrp="1"/>
-          </p:cNvSpPr>
-          <p:nvPr>
-            <p:ph idx="1"/>
-          </p:nvPr>
-        </p:nvSpPr>
-        <p:spPr/>
-        <p:txBody>
-          <a:bodyPr/>
-          <a:lstStyle/>
-          <a:p>
-            <a:r>
-              <a:rPr lang="en-US" dirty="0">
-                <a:latin typeface="Helvetica"/>
-                <a:cs typeface="Helvetica"/>
-              </a:rPr>
-              <a:t>Trump – </a:t>
-            </a:r>
-            <a:r>
-              <a:rPr lang="en-US" dirty="0">
-                <a:latin typeface="Helvetica"/>
-                <a:cs typeface="Helvetica"/>
-                <a:hlinkClick r:id="rId2"/>
-              </a:rPr>
-              <a:t>https://tribwgntv.files.wordpress.com/2017/01/twwet.png</a:t>
+              <a:t>“Sides” of Chicago, cont.</a:t>
             </a:r>
             <a:endParaRPr lang="en-US" dirty="0">
+              <a:solidFill>
+                <a:schemeClr val="accent6">
+                  <a:lumMod val="75000"/>
+                </a:schemeClr>
+              </a:solidFill>
               <a:latin typeface="Helvetica"/>
               <a:cs typeface="Helvetica"/>
             </a:endParaRPr>
           </a:p>
-          <a:p>
-            <a:r>
-              <a:rPr lang="en-US" dirty="0">
-                <a:latin typeface="Helvetica"/>
-                <a:cs typeface="Helvetica"/>
-              </a:rPr>
-              <a:t>Chi-</a:t>
-            </a:r>
-            <a:r>
-              <a:rPr lang="en-US" dirty="0" err="1">
-                <a:latin typeface="Helvetica"/>
-                <a:cs typeface="Helvetica"/>
-              </a:rPr>
-              <a:t>raq</a:t>
-            </a:r>
-            <a:r>
-              <a:rPr lang="en-US" dirty="0">
-                <a:latin typeface="Helvetica"/>
-                <a:cs typeface="Helvetica"/>
-              </a:rPr>
-              <a:t> https://upload.wikimedia.org/wikipedia/en/thumb/e/e7/ChiRaqMoviePoster.png/220px-ChiRaqMoviePoster.png</a:t>
-            </a:r>
-          </a:p>
-          <a:p>
-            <a:r>
-              <a:rPr lang="en-US" dirty="0">
-                <a:latin typeface="Helvetica"/>
-                <a:cs typeface="Helvetica"/>
-              </a:rPr>
-              <a:t>Communities - https://upload.wikimedia.org/wikipedia/commons/thumb/2/24/Map_of_the_Community_Areas_and_%27Sides%27_of_the_City_of_Chicago.svg/350px-Map_of_the_Community_Areas_and_%27Sides%27_of_the_City_of_Chicago.svg.png</a:t>
-            </a:r>
-          </a:p>
         </p:txBody>
       </p:sp>
     </p:spTree>
     <p:extLst>
       <p:ext uri="{BB962C8B-B14F-4D97-AF65-F5344CB8AC3E}">
-        <p14:creationId xmlns:p14="http://schemas.microsoft.com/office/powerpoint/2010/main" val="986977783"/>
+        <p14:creationId xmlns:p14="http://schemas.microsoft.com/office/powerpoint/2010/main" val="3061157347"/>
       </p:ext>
     </p:extLst>
   </p:cSld>
@@ -8725,12 +9501,27 @@
       </p:transition>
     </mc:Fallback>
   </mc:AlternateContent>
+  <p:timing>
+    <p:tnLst>
+      <p:par>
+        <p:cTn xmlns:p14="http://schemas.microsoft.com/office/powerpoint/2010/main" id="1" dur="indefinite" restart="never" nodeType="tmRoot"/>
+      </p:par>
+    </p:tnLst>
+  </p:timing>
 </p:sld>
 </file>
 
 <file path=ppt/slides/slide8.xml><?xml version="1.0" encoding="utf-8"?>
 <p:sld xmlns:a="http://schemas.openxmlformats.org/drawingml/2006/main" xmlns:r="http://schemas.openxmlformats.org/officeDocument/2006/relationships" xmlns:p="http://schemas.openxmlformats.org/presentationml/2006/main">
   <p:cSld>
+    <p:bg>
+      <p:bgPr>
+        <a:solidFill>
+          <a:schemeClr val="tx1"/>
+        </a:solidFill>
+        <a:effectLst/>
+      </p:bgPr>
+    </p:bg>
     <p:spTree>
       <p:nvGrpSpPr>
         <p:cNvPr id="1" name=""/>
@@ -8747,7 +9538,7 @@
       </p:grpSpPr>
       <p:sp>
         <p:nvSpPr>
-          <p:cNvPr id="2" name="Title 1"/>
+          <p:cNvPr id="7" name="Title 1"/>
           <p:cNvSpPr>
             <a:spLocks noGrp="1"/>
           </p:cNvSpPr>
@@ -8757,8 +9548,8 @@
         </p:nvSpPr>
         <p:spPr>
           <a:xfrm>
-            <a:off x="841248" y="2819400"/>
-            <a:ext cx="9601200" cy="1838519"/>
+            <a:off x="838200" y="-76200"/>
+            <a:ext cx="10515600" cy="1145224"/>
           </a:xfrm>
         </p:spPr>
         <p:txBody>
@@ -8767,59 +9558,90 @@
           <a:p>
             <a:r>
               <a:rPr lang="en-US" dirty="0" smtClean="0">
+                <a:solidFill>
+                  <a:schemeClr val="accent6">
+                    <a:lumMod val="75000"/>
+                  </a:schemeClr>
+                </a:solidFill>
                 <a:latin typeface="Helvetica"/>
                 <a:cs typeface="Helvetica"/>
               </a:rPr>
-              <a:t>Bayesian Regression </a:t>
-            </a:r>
-            <a:r>
-              <a:rPr lang="en-US" dirty="0">
-                <a:latin typeface="Helvetica"/>
-                <a:cs typeface="Helvetica"/>
-              </a:rPr>
-              <a:t>Modeling</a:t>
-            </a:r>
-          </a:p>
-        </p:txBody>
-      </p:sp>
-      <p:sp>
-        <p:nvSpPr>
-          <p:cNvPr id="3" name="Text Placeholder 2"/>
-          <p:cNvSpPr>
-            <a:spLocks noGrp="1"/>
-          </p:cNvSpPr>
-          <p:nvPr>
-            <p:ph type="body" idx="1"/>
-          </p:nvPr>
-        </p:nvSpPr>
-        <p:spPr>
-          <a:xfrm>
-            <a:off x="841248" y="4800600"/>
-            <a:ext cx="9601200" cy="475488"/>
-          </a:xfrm>
-        </p:spPr>
-        <p:txBody>
-          <a:bodyPr/>
-          <a:lstStyle/>
-          <a:p>
-            <a:r>
-              <a:rPr lang="en-US" dirty="0" smtClean="0">
-                <a:latin typeface="Helvetica"/>
-                <a:cs typeface="Helvetica"/>
-              </a:rPr>
-              <a:t>A spatial analysis of crime data</a:t>
+              <a:t>South Side</a:t>
             </a:r>
             <a:endParaRPr lang="en-US" dirty="0">
+              <a:solidFill>
+                <a:schemeClr val="accent6">
+                  <a:lumMod val="75000"/>
+                </a:schemeClr>
+              </a:solidFill>
               <a:latin typeface="Helvetica"/>
               <a:cs typeface="Helvetica"/>
             </a:endParaRPr>
           </a:p>
         </p:txBody>
       </p:sp>
+      <p:pic>
+        <p:nvPicPr>
+          <p:cNvPr id="2" name="Picture 1" descr="south_ACF.png"/>
+          <p:cNvPicPr>
+            <a:picLocks noChangeAspect="1"/>
+          </p:cNvPicPr>
+          <p:nvPr/>
+        </p:nvPicPr>
+        <p:blipFill rotWithShape="1">
+          <a:blip r:embed="rId2">
+            <a:extLst>
+              <a:ext uri="{28A0092B-C50C-407E-A947-70E740481C1C}">
+                <a14:useLocalDpi xmlns:a14="http://schemas.microsoft.com/office/drawing/2010/main" val="0"/>
+              </a:ext>
+            </a:extLst>
+          </a:blip>
+          <a:srcRect t="24433" b="6379"/>
+          <a:stretch/>
+        </p:blipFill>
+        <p:spPr>
+          <a:xfrm>
+            <a:off x="2362200" y="1219200"/>
+            <a:ext cx="7469377" cy="2253290"/>
+          </a:xfrm>
+          <a:prstGeom prst="rect">
+            <a:avLst/>
+          </a:prstGeom>
+        </p:spPr>
+      </p:pic>
+      <p:pic>
+        <p:nvPicPr>
+          <p:cNvPr id="4" name="Picture 3" descr="south_PACF.png"/>
+          <p:cNvPicPr>
+            <a:picLocks noChangeAspect="1"/>
+          </p:cNvPicPr>
+          <p:nvPr/>
+        </p:nvPicPr>
+        <p:blipFill rotWithShape="1">
+          <a:blip r:embed="rId3">
+            <a:extLst>
+              <a:ext uri="{28A0092B-C50C-407E-A947-70E740481C1C}">
+                <a14:useLocalDpi xmlns:a14="http://schemas.microsoft.com/office/drawing/2010/main" val="0"/>
+              </a:ext>
+            </a:extLst>
+          </a:blip>
+          <a:srcRect t="22757" b="5670"/>
+          <a:stretch/>
+        </p:blipFill>
+        <p:spPr>
+          <a:xfrm>
+            <a:off x="2362200" y="3657600"/>
+            <a:ext cx="7569385" cy="2362200"/>
+          </a:xfrm>
+          <a:prstGeom prst="rect">
+            <a:avLst/>
+          </a:prstGeom>
+        </p:spPr>
+      </p:pic>
     </p:spTree>
     <p:extLst>
       <p:ext uri="{BB962C8B-B14F-4D97-AF65-F5344CB8AC3E}">
-        <p14:creationId xmlns:p14="http://schemas.microsoft.com/office/powerpoint/2010/main" val="1945622998"/>
+        <p14:creationId xmlns:p14="http://schemas.microsoft.com/office/powerpoint/2010/main" val="3675338084"/>
       </p:ext>
     </p:extLst>
   </p:cSld>
@@ -8838,6 +9660,13 @@
       </p:transition>
     </mc:Fallback>
   </mc:AlternateContent>
+  <p:timing>
+    <p:tnLst>
+      <p:par>
+        <p:cTn xmlns:p14="http://schemas.microsoft.com/office/powerpoint/2010/main" id="1" dur="indefinite" restart="never" nodeType="tmRoot"/>
+      </p:par>
+    </p:tnLst>
+  </p:timing>
 </p:sld>
 </file>
 
@@ -8868,7 +9697,7 @@
       </p:grpSpPr>
       <p:sp>
         <p:nvSpPr>
-          <p:cNvPr id="2" name="Title 1"/>
+          <p:cNvPr id="7" name="Title 1"/>
           <p:cNvSpPr>
             <a:spLocks noGrp="1"/>
           </p:cNvSpPr>
@@ -8896,7 +9725,31 @@
                 <a:latin typeface="Helvetica"/>
                 <a:cs typeface="Helvetica"/>
               </a:rPr>
-              <a:t>LASSO Regression Model</a:t>
+              <a:t>South Side </a:t>
+            </a:r>
+            <a:r>
+              <a:rPr lang="mr-IN" dirty="0" smtClean="0">
+                <a:solidFill>
+                  <a:schemeClr val="accent6">
+                    <a:lumMod val="75000"/>
+                  </a:schemeClr>
+                </a:solidFill>
+                <a:latin typeface="Helvetica"/>
+                <a:cs typeface="Helvetica"/>
+              </a:rPr>
+              <a:t>–</a:t>
+            </a:r>
+            <a:r>
+              <a:rPr lang="en-US" dirty="0" smtClean="0">
+                <a:solidFill>
+                  <a:schemeClr val="accent6">
+                    <a:lumMod val="75000"/>
+                  </a:schemeClr>
+                </a:solidFill>
+                <a:latin typeface="Helvetica"/>
+                <a:cs typeface="Helvetica"/>
+              </a:rPr>
+              <a:t> ARIMA(4,0,0)x(1,0,0)[12]</a:t>
             </a:r>
             <a:endParaRPr lang="en-US" dirty="0">
               <a:solidFill>
@@ -8912,22 +9765,57 @@
       </p:sp>
       <p:pic>
         <p:nvPicPr>
-          <p:cNvPr id="8" name="Picture 7"/>
+          <p:cNvPr id="3" name="Picture 2" descr="Americas_Warzone.pdf"/>
+          <p:cNvPicPr>
+            <a:picLocks noChangeAspect="1"/>
+          </p:cNvPicPr>
+          <p:nvPr/>
+        </p:nvPicPr>
+        <p:blipFill rotWithShape="1">
+          <a:blip r:embed="rId2">
+            <a:extLst>
+              <a:ext uri="{28A0092B-C50C-407E-A947-70E740481C1C}">
+                <a14:useLocalDpi xmlns:a14="http://schemas.microsoft.com/office/drawing/2010/main" val="0"/>
+              </a:ext>
+            </a:extLst>
+          </a:blip>
+          <a:srcRect l="25703" t="9362" r="26073" b="84464"/>
+          <a:stretch/>
+        </p:blipFill>
+        <p:spPr>
+          <a:xfrm>
+            <a:off x="1905000" y="1371600"/>
+            <a:ext cx="8543907" cy="1415373"/>
+          </a:xfrm>
+          <a:prstGeom prst="rect">
+            <a:avLst/>
+          </a:prstGeom>
+        </p:spPr>
+      </p:pic>
+      <p:pic>
+        <p:nvPicPr>
+          <p:cNvPr id="5" name="Picture 4" descr="south_resid.png"/>
           <p:cNvPicPr>
             <a:picLocks noChangeAspect="1"/>
           </p:cNvPicPr>
           <p:nvPr/>
         </p:nvPicPr>
         <p:blipFill>
-          <a:blip r:embed="rId2"/>
+          <a:blip r:embed="rId3">
+            <a:extLst>
+              <a:ext uri="{28A0092B-C50C-407E-A947-70E740481C1C}">
+                <a14:useLocalDpi xmlns:a14="http://schemas.microsoft.com/office/drawing/2010/main" val="0"/>
+              </a:ext>
+            </a:extLst>
+          </a:blip>
           <a:stretch>
             <a:fillRect/>
           </a:stretch>
         </p:blipFill>
         <p:spPr>
           <a:xfrm>
-            <a:off x="762000" y="1391105"/>
-            <a:ext cx="10820400" cy="4857295"/>
+            <a:off x="2581275" y="3048000"/>
+            <a:ext cx="7400925" cy="3226944"/>
           </a:xfrm>
           <a:prstGeom prst="rect">
             <a:avLst/>
@@ -8937,7 +9825,7 @@
     </p:spTree>
     <p:extLst>
       <p:ext uri="{BB962C8B-B14F-4D97-AF65-F5344CB8AC3E}">
-        <p14:creationId xmlns:p14="http://schemas.microsoft.com/office/powerpoint/2010/main" val="1159850092"/>
+        <p14:creationId xmlns:p14="http://schemas.microsoft.com/office/powerpoint/2010/main" val="2824660212"/>
       </p:ext>
     </p:extLst>
   </p:cSld>
@@ -8956,6 +9844,13 @@
       </p:transition>
     </mc:Fallback>
   </mc:AlternateContent>
+  <p:timing>
+    <p:tnLst>
+      <p:par>
+        <p:cTn xmlns:p14="http://schemas.microsoft.com/office/powerpoint/2010/main" id="1" dur="indefinite" restart="never" nodeType="tmRoot"/>
+      </p:par>
+    </p:tnLst>
+  </p:timing>
 </p:sld>
 </file>
 
@@ -9214,7 +10109,7 @@
   <a:extraClrSchemeLst/>
   <a:extLst>
     <a:ext uri="{05A4C25C-085E-4340-85A3-A5531E510DB2}">
-      <thm15:themeFamily xmlns:thm15="http://schemas.microsoft.com/office/thememl/2012/main" xmlns="" name="TF00001123.potx" id="{55B65C5C-2110-41C9-9432-67D739EC5CFC}" vid="{FDE12540-4521-4F30-863D-D54DD2EE1C3B}"/>
+      <thm15:themeFamily xmlns="" xmlns:thm15="http://schemas.microsoft.com/office/thememl/2012/main" name="TF00001123.potx" id="{55B65C5C-2110-41C9-9432-67D739EC5CFC}" vid="{FDE12540-4521-4F30-863D-D54DD2EE1C3B}"/>
     </a:ext>
   </a:extLst>
 </a:theme>
@@ -9795,7 +10690,7 @@
   <a:extraClrSchemeLst/>
   <a:extLst>
     <a:ext uri="{05A4C25C-085E-4340-85A3-A5531E510DB2}">
-      <thm15:themeFamily xmlns:thm15="http://schemas.microsoft.com/office/thememl/2012/main" xmlns="" name="Office Theme" id="{62F939B6-93AF-4DB8-9C6B-D6C7DFDC589F}" vid="{4A3C46E8-61CC-4603-A589-7422A47A8E4A}"/>
+      <thm15:themeFamily xmlns="" xmlns:thm15="http://schemas.microsoft.com/office/thememl/2012/main" name="Office Theme" id="{62F939B6-93AF-4DB8-9C6B-D6C7DFDC589F}" vid="{4A3C46E8-61CC-4603-A589-7422A47A8E4A}"/>
     </a:ext>
   </a:extLst>
 </a:theme>
@@ -10056,7 +10951,7 @@
   <a:extraClrSchemeLst/>
   <a:extLst>
     <a:ext uri="{05A4C25C-085E-4340-85A3-A5531E510DB2}">
-      <thm15:themeFamily xmlns:thm15="http://schemas.microsoft.com/office/thememl/2012/main" xmlns="" name="Office Theme" id="{62F939B6-93AF-4DB8-9C6B-D6C7DFDC589F}" vid="{4A3C46E8-61CC-4603-A589-7422A47A8E4A}"/>
+      <thm15:themeFamily xmlns="" xmlns:thm15="http://schemas.microsoft.com/office/thememl/2012/main" name="Office Theme" id="{62F939B6-93AF-4DB8-9C6B-D6C7DFDC589F}" vid="{4A3C46E8-61CC-4603-A589-7422A47A8E4A}"/>
     </a:ext>
   </a:extLst>
 </a:theme>

</xml_diff>

<commit_message>
Slides updated a little
</commit_message>
<xml_diff>
--- a/Slides/final_slides.pptx
+++ b/Slides/final_slides.pptx
@@ -6,10 +6,10 @@
     <p:sldMasterId id="2147483660" r:id="rId2"/>
   </p:sldMasterIdLst>
   <p:notesMasterIdLst>
-    <p:notesMasterId r:id="rId20"/>
+    <p:notesMasterId r:id="rId21"/>
   </p:notesMasterIdLst>
   <p:handoutMasterIdLst>
-    <p:handoutMasterId r:id="rId21"/>
+    <p:handoutMasterId r:id="rId22"/>
   </p:handoutMasterIdLst>
   <p:sldIdLst>
     <p:sldId id="256" r:id="rId3"/>
@@ -23,12 +23,13 @@
     <p:sldId id="274" r:id="rId11"/>
     <p:sldId id="275" r:id="rId12"/>
     <p:sldId id="264" r:id="rId13"/>
-    <p:sldId id="265" r:id="rId14"/>
-    <p:sldId id="266" r:id="rId15"/>
-    <p:sldId id="267" r:id="rId16"/>
-    <p:sldId id="268" r:id="rId17"/>
-    <p:sldId id="277" r:id="rId18"/>
-    <p:sldId id="269" r:id="rId19"/>
+    <p:sldId id="278" r:id="rId14"/>
+    <p:sldId id="265" r:id="rId15"/>
+    <p:sldId id="266" r:id="rId16"/>
+    <p:sldId id="267" r:id="rId17"/>
+    <p:sldId id="268" r:id="rId18"/>
+    <p:sldId id="277" r:id="rId19"/>
+    <p:sldId id="269" r:id="rId20"/>
   </p:sldIdLst>
   <p:sldSz cx="12192000" cy="6858000"/>
   <p:notesSz cx="6858000" cy="9144000"/>
@@ -129,10 +130,21 @@
   </p:defaultTextStyle>
   <p:extLst>
     <p:ext uri="{EFAFB233-063F-42B5-8137-9DF3F51BA10A}">
-      <p15:sldGuideLst xmlns="" xmlns:p15="http://schemas.microsoft.com/office/powerpoint/2012/main"/>
+      <p15:sldGuideLst xmlns:p15="http://schemas.microsoft.com/office/powerpoint/2012/main">
+        <p15:guide id="1" orient="horz" pos="2160">
+          <p15:clr>
+            <a:srgbClr val="A4A3A4"/>
+          </p15:clr>
+        </p15:guide>
+        <p15:guide id="2" pos="3840">
+          <p15:clr>
+            <a:srgbClr val="A4A3A4"/>
+          </p15:clr>
+        </p15:guide>
+      </p15:sldGuideLst>
     </p:ext>
     <p:ext uri="{2D200454-40CA-4A62-9FC3-DE9A4176ACB9}">
-      <p15:notesGuideLst xmlns="" xmlns:p15="http://schemas.microsoft.com/office/powerpoint/2012/main"/>
+      <p15:notesGuideLst xmlns:p15="http://schemas.microsoft.com/office/powerpoint/2012/main"/>
     </p:ext>
   </p:extLst>
 </p:presentation>
@@ -220,7 +232,7 @@
           <a:p>
             <a:fld id="{061C5132-FFA3-4B02-9F09-22FCF40EFA74}" type="datetimeFigureOut">
               <a:rPr lang="en-US" smtClean="0"/>
-              <a:t>5/1/17</a:t>
+              <a:t>5/2/2017</a:t>
             </a:fld>
             <a:endParaRPr lang="en-US"/>
           </a:p>
@@ -385,7 +397,7 @@
           <a:p>
             <a:fld id="{0B6E42C9-243F-4DC5-AFF6-9D56B5FA9D63}" type="datetimeFigureOut">
               <a:rPr lang="en-US" smtClean="0"/>
-              <a:t>5/1/17</a:t>
+              <a:t>5/2/2017</a:t>
             </a:fld>
             <a:endParaRPr lang="en-US"/>
           </a:p>
@@ -1073,7 +1085,7 @@
           <a:p>
             <a:fld id="{B0FE2824-C2A0-4931-BB32-60B24BDBB3CC}" type="datetimeFigureOut">
               <a:rPr lang="en-US" smtClean="0"/>
-              <a:t>5/1/17</a:t>
+              <a:t>5/2/2017</a:t>
             </a:fld>
             <a:endParaRPr lang="en-US"/>
           </a:p>
@@ -1268,7 +1280,7 @@
           <a:p>
             <a:fld id="{B0FE2824-C2A0-4931-BB32-60B24BDBB3CC}" type="datetimeFigureOut">
               <a:rPr lang="en-US" smtClean="0"/>
-              <a:t>5/1/17</a:t>
+              <a:t>5/2/2017</a:t>
             </a:fld>
             <a:endParaRPr lang="en-US"/>
           </a:p>
@@ -1363,10 +1375,9 @@
           <a:lstStyle/>
           <a:p>
             <a:r>
-              <a:rPr lang="en-US" smtClean="0"/>
+              <a:rPr lang="en-US"/>
               <a:t>Click to edit Master title style</a:t>
             </a:r>
-            <a:endParaRPr lang="en-US"/>
           </a:p>
         </p:txBody>
       </p:sp>
@@ -1485,10 +1496,9 @@
           </a:lstStyle>
           <a:p>
             <a:r>
-              <a:rPr lang="en-US" smtClean="0"/>
+              <a:rPr lang="en-US"/>
               <a:t>Click to edit Master subtitle style</a:t>
             </a:r>
-            <a:endParaRPr lang="en-US"/>
           </a:p>
         </p:txBody>
       </p:sp>
@@ -1517,7 +1527,7 @@
           <a:p>
             <a:fld id="{B4AAAF38-FA28-AC45-9E1F-E60DE1B3F365}" type="datetimeFigureOut">
               <a:rPr lang="en-US" smtClean="0"/>
-              <a:t>5/1/17</a:t>
+              <a:t>5/2/2017</a:t>
             </a:fld>
             <a:endParaRPr lang="en-US"/>
           </a:p>
@@ -1635,10 +1645,9 @@
           <a:lstStyle/>
           <a:p>
             <a:r>
-              <a:rPr lang="en-US" smtClean="0"/>
+              <a:rPr lang="en-US"/>
               <a:t>Click to edit Master title style</a:t>
             </a:r>
-            <a:endParaRPr lang="en-US"/>
           </a:p>
         </p:txBody>
       </p:sp>
@@ -1667,38 +1676,37 @@
           <a:p>
             <a:pPr lvl="0"/>
             <a:r>
-              <a:rPr lang="en-US" smtClean="0"/>
+              <a:rPr lang="en-US"/>
               <a:t>Click to edit Master text styles</a:t>
             </a:r>
           </a:p>
           <a:p>
             <a:pPr lvl="1"/>
             <a:r>
-              <a:rPr lang="en-US" smtClean="0"/>
+              <a:rPr lang="en-US"/>
               <a:t>Second level</a:t>
             </a:r>
           </a:p>
           <a:p>
             <a:pPr lvl="2"/>
             <a:r>
-              <a:rPr lang="en-US" smtClean="0"/>
+              <a:rPr lang="en-US"/>
               <a:t>Third level</a:t>
             </a:r>
           </a:p>
           <a:p>
             <a:pPr lvl="3"/>
             <a:r>
-              <a:rPr lang="en-US" smtClean="0"/>
+              <a:rPr lang="en-US"/>
               <a:t>Fourth level</a:t>
             </a:r>
           </a:p>
           <a:p>
             <a:pPr lvl="4"/>
             <a:r>
-              <a:rPr lang="en-US" smtClean="0"/>
+              <a:rPr lang="en-US"/>
               <a:t>Fifth level</a:t>
             </a:r>
-            <a:endParaRPr lang="en-US"/>
           </a:p>
         </p:txBody>
       </p:sp>
@@ -1727,7 +1735,7 @@
           <a:p>
             <a:fld id="{B4AAAF38-FA28-AC45-9E1F-E60DE1B3F365}" type="datetimeFigureOut">
               <a:rPr lang="en-US" smtClean="0"/>
-              <a:t>5/1/17</a:t>
+              <a:t>5/2/2017</a:t>
             </a:fld>
             <a:endParaRPr lang="en-US"/>
           </a:p>
@@ -1849,10 +1857,9 @@
           </a:lstStyle>
           <a:p>
             <a:r>
-              <a:rPr lang="en-US" smtClean="0"/>
+              <a:rPr lang="en-US"/>
               <a:t>Click to edit Master title style</a:t>
             </a:r>
-            <a:endParaRPr lang="en-US"/>
           </a:p>
         </p:txBody>
       </p:sp>
@@ -1972,7 +1979,7 @@
           <a:p>
             <a:pPr lvl="0"/>
             <a:r>
-              <a:rPr lang="en-US" smtClean="0"/>
+              <a:rPr lang="en-US"/>
               <a:t>Click to edit Master text styles</a:t>
             </a:r>
           </a:p>
@@ -2003,7 +2010,7 @@
           <a:p>
             <a:fld id="{B4AAAF38-FA28-AC45-9E1F-E60DE1B3F365}" type="datetimeFigureOut">
               <a:rPr lang="en-US" smtClean="0"/>
-              <a:t>5/1/17</a:t>
+              <a:t>5/2/2017</a:t>
             </a:fld>
             <a:endParaRPr lang="en-US"/>
           </a:p>
@@ -2121,10 +2128,9 @@
           <a:lstStyle/>
           <a:p>
             <a:r>
-              <a:rPr lang="en-US" smtClean="0"/>
+              <a:rPr lang="en-US"/>
               <a:t>Click to edit Master title style</a:t>
             </a:r>
-            <a:endParaRPr lang="en-US"/>
           </a:p>
         </p:txBody>
       </p:sp>
@@ -2181,38 +2187,37 @@
           <a:p>
             <a:pPr lvl="0"/>
             <a:r>
-              <a:rPr lang="en-US" smtClean="0"/>
+              <a:rPr lang="en-US"/>
               <a:t>Click to edit Master text styles</a:t>
             </a:r>
           </a:p>
           <a:p>
             <a:pPr lvl="1"/>
             <a:r>
-              <a:rPr lang="en-US" smtClean="0"/>
+              <a:rPr lang="en-US"/>
               <a:t>Second level</a:t>
             </a:r>
           </a:p>
           <a:p>
             <a:pPr lvl="2"/>
             <a:r>
-              <a:rPr lang="en-US" smtClean="0"/>
+              <a:rPr lang="en-US"/>
               <a:t>Third level</a:t>
             </a:r>
           </a:p>
           <a:p>
             <a:pPr lvl="3"/>
             <a:r>
-              <a:rPr lang="en-US" smtClean="0"/>
+              <a:rPr lang="en-US"/>
               <a:t>Fourth level</a:t>
             </a:r>
           </a:p>
           <a:p>
             <a:pPr lvl="4"/>
             <a:r>
-              <a:rPr lang="en-US" smtClean="0"/>
+              <a:rPr lang="en-US"/>
               <a:t>Fifth level</a:t>
             </a:r>
-            <a:endParaRPr lang="en-US"/>
           </a:p>
         </p:txBody>
       </p:sp>
@@ -2269,38 +2274,37 @@
           <a:p>
             <a:pPr lvl="0"/>
             <a:r>
-              <a:rPr lang="en-US" smtClean="0"/>
+              <a:rPr lang="en-US"/>
               <a:t>Click to edit Master text styles</a:t>
             </a:r>
           </a:p>
           <a:p>
             <a:pPr lvl="1"/>
             <a:r>
-              <a:rPr lang="en-US" smtClean="0"/>
+              <a:rPr lang="en-US"/>
               <a:t>Second level</a:t>
             </a:r>
           </a:p>
           <a:p>
             <a:pPr lvl="2"/>
             <a:r>
-              <a:rPr lang="en-US" smtClean="0"/>
+              <a:rPr lang="en-US"/>
               <a:t>Third level</a:t>
             </a:r>
           </a:p>
           <a:p>
             <a:pPr lvl="3"/>
             <a:r>
-              <a:rPr lang="en-US" smtClean="0"/>
+              <a:rPr lang="en-US"/>
               <a:t>Fourth level</a:t>
             </a:r>
           </a:p>
           <a:p>
             <a:pPr lvl="4"/>
             <a:r>
-              <a:rPr lang="en-US" smtClean="0"/>
+              <a:rPr lang="en-US"/>
               <a:t>Fifth level</a:t>
             </a:r>
-            <a:endParaRPr lang="en-US"/>
           </a:p>
         </p:txBody>
       </p:sp>
@@ -2329,7 +2333,7 @@
           <a:p>
             <a:fld id="{B4AAAF38-FA28-AC45-9E1F-E60DE1B3F365}" type="datetimeFigureOut">
               <a:rPr lang="en-US" smtClean="0"/>
-              <a:t>5/1/17</a:t>
+              <a:t>5/2/2017</a:t>
             </a:fld>
             <a:endParaRPr lang="en-US"/>
           </a:p>
@@ -2451,10 +2455,9 @@
           </a:lstStyle>
           <a:p>
             <a:r>
-              <a:rPr lang="en-US" smtClean="0"/>
+              <a:rPr lang="en-US"/>
               <a:t>Click to edit Master title style</a:t>
             </a:r>
-            <a:endParaRPr lang="en-US"/>
           </a:p>
         </p:txBody>
       </p:sp>
@@ -2520,7 +2523,7 @@
           <a:p>
             <a:pPr lvl="0"/>
             <a:r>
-              <a:rPr lang="en-US" smtClean="0"/>
+              <a:rPr lang="en-US"/>
               <a:t>Click to edit Master text styles</a:t>
             </a:r>
           </a:p>
@@ -2579,38 +2582,37 @@
           <a:p>
             <a:pPr lvl="0"/>
             <a:r>
-              <a:rPr lang="en-US" smtClean="0"/>
+              <a:rPr lang="en-US"/>
               <a:t>Click to edit Master text styles</a:t>
             </a:r>
           </a:p>
           <a:p>
             <a:pPr lvl="1"/>
             <a:r>
-              <a:rPr lang="en-US" smtClean="0"/>
+              <a:rPr lang="en-US"/>
               <a:t>Second level</a:t>
             </a:r>
           </a:p>
           <a:p>
             <a:pPr lvl="2"/>
             <a:r>
-              <a:rPr lang="en-US" smtClean="0"/>
+              <a:rPr lang="en-US"/>
               <a:t>Third level</a:t>
             </a:r>
           </a:p>
           <a:p>
             <a:pPr lvl="3"/>
             <a:r>
-              <a:rPr lang="en-US" smtClean="0"/>
+              <a:rPr lang="en-US"/>
               <a:t>Fourth level</a:t>
             </a:r>
           </a:p>
           <a:p>
             <a:pPr lvl="4"/>
             <a:r>
-              <a:rPr lang="en-US" smtClean="0"/>
+              <a:rPr lang="en-US"/>
               <a:t>Fifth level</a:t>
             </a:r>
-            <a:endParaRPr lang="en-US"/>
           </a:p>
         </p:txBody>
       </p:sp>
@@ -2676,7 +2678,7 @@
           <a:p>
             <a:pPr lvl="0"/>
             <a:r>
-              <a:rPr lang="en-US" smtClean="0"/>
+              <a:rPr lang="en-US"/>
               <a:t>Click to edit Master text styles</a:t>
             </a:r>
           </a:p>
@@ -2735,38 +2737,37 @@
           <a:p>
             <a:pPr lvl="0"/>
             <a:r>
-              <a:rPr lang="en-US" smtClean="0"/>
+              <a:rPr lang="en-US"/>
               <a:t>Click to edit Master text styles</a:t>
             </a:r>
           </a:p>
           <a:p>
             <a:pPr lvl="1"/>
             <a:r>
-              <a:rPr lang="en-US" smtClean="0"/>
+              <a:rPr lang="en-US"/>
               <a:t>Second level</a:t>
             </a:r>
           </a:p>
           <a:p>
             <a:pPr lvl="2"/>
             <a:r>
-              <a:rPr lang="en-US" smtClean="0"/>
+              <a:rPr lang="en-US"/>
               <a:t>Third level</a:t>
             </a:r>
           </a:p>
           <a:p>
             <a:pPr lvl="3"/>
             <a:r>
-              <a:rPr lang="en-US" smtClean="0"/>
+              <a:rPr lang="en-US"/>
               <a:t>Fourth level</a:t>
             </a:r>
           </a:p>
           <a:p>
             <a:pPr lvl="4"/>
             <a:r>
-              <a:rPr lang="en-US" smtClean="0"/>
+              <a:rPr lang="en-US"/>
               <a:t>Fifth level</a:t>
             </a:r>
-            <a:endParaRPr lang="en-US"/>
           </a:p>
         </p:txBody>
       </p:sp>
@@ -2795,7 +2796,7 @@
           <a:p>
             <a:fld id="{B4AAAF38-FA28-AC45-9E1F-E60DE1B3F365}" type="datetimeFigureOut">
               <a:rPr lang="en-US" smtClean="0"/>
-              <a:t>5/1/17</a:t>
+              <a:t>5/2/2017</a:t>
             </a:fld>
             <a:endParaRPr lang="en-US"/>
           </a:p>
@@ -2913,10 +2914,9 @@
           <a:lstStyle/>
           <a:p>
             <a:r>
-              <a:rPr lang="en-US" smtClean="0"/>
+              <a:rPr lang="en-US"/>
               <a:t>Click to edit Master title style</a:t>
             </a:r>
-            <a:endParaRPr lang="en-US"/>
           </a:p>
         </p:txBody>
       </p:sp>
@@ -2945,7 +2945,7 @@
           <a:p>
             <a:fld id="{B4AAAF38-FA28-AC45-9E1F-E60DE1B3F365}" type="datetimeFigureOut">
               <a:rPr lang="en-US" smtClean="0"/>
-              <a:t>5/1/17</a:t>
+              <a:t>5/2/2017</a:t>
             </a:fld>
             <a:endParaRPr lang="en-US"/>
           </a:p>
@@ -3064,7 +3064,7 @@
           <a:p>
             <a:fld id="{B4AAAF38-FA28-AC45-9E1F-E60DE1B3F365}" type="datetimeFigureOut">
               <a:rPr lang="en-US" smtClean="0"/>
-              <a:t>5/1/17</a:t>
+              <a:t>5/2/2017</a:t>
             </a:fld>
             <a:endParaRPr lang="en-US"/>
           </a:p>
@@ -3186,10 +3186,9 @@
           </a:lstStyle>
           <a:p>
             <a:r>
-              <a:rPr lang="en-US" smtClean="0"/>
+              <a:rPr lang="en-US"/>
               <a:t>Click to edit Master title style</a:t>
             </a:r>
-            <a:endParaRPr lang="en-US"/>
           </a:p>
         </p:txBody>
       </p:sp>
@@ -3246,38 +3245,37 @@
           <a:p>
             <a:pPr lvl="0"/>
             <a:r>
-              <a:rPr lang="en-US" smtClean="0"/>
+              <a:rPr lang="en-US"/>
               <a:t>Click to edit Master text styles</a:t>
             </a:r>
           </a:p>
           <a:p>
             <a:pPr lvl="1"/>
             <a:r>
-              <a:rPr lang="en-US" smtClean="0"/>
+              <a:rPr lang="en-US"/>
               <a:t>Second level</a:t>
             </a:r>
           </a:p>
           <a:p>
             <a:pPr lvl="2"/>
             <a:r>
-              <a:rPr lang="en-US" smtClean="0"/>
+              <a:rPr lang="en-US"/>
               <a:t>Third level</a:t>
             </a:r>
           </a:p>
           <a:p>
             <a:pPr lvl="3"/>
             <a:r>
-              <a:rPr lang="en-US" smtClean="0"/>
+              <a:rPr lang="en-US"/>
               <a:t>Fourth level</a:t>
             </a:r>
           </a:p>
           <a:p>
             <a:pPr lvl="4"/>
             <a:r>
-              <a:rPr lang="en-US" smtClean="0"/>
+              <a:rPr lang="en-US"/>
               <a:t>Fifth level</a:t>
             </a:r>
-            <a:endParaRPr lang="en-US"/>
           </a:p>
         </p:txBody>
       </p:sp>
@@ -3343,7 +3341,7 @@
           <a:p>
             <a:pPr lvl="0"/>
             <a:r>
-              <a:rPr lang="en-US" smtClean="0"/>
+              <a:rPr lang="en-US"/>
               <a:t>Click to edit Master text styles</a:t>
             </a:r>
           </a:p>
@@ -3374,7 +3372,7 @@
           <a:p>
             <a:fld id="{B4AAAF38-FA28-AC45-9E1F-E60DE1B3F365}" type="datetimeFigureOut">
               <a:rPr lang="en-US" smtClean="0"/>
-              <a:t>5/1/17</a:t>
+              <a:t>5/2/2017</a:t>
             </a:fld>
             <a:endParaRPr lang="en-US"/>
           </a:p>
@@ -3577,7 +3575,7 @@
           <a:p>
             <a:fld id="{B0FE2824-C2A0-4931-BB32-60B24BDBB3CC}" type="datetimeFigureOut">
               <a:rPr lang="en-US" smtClean="0"/>
-              <a:t>5/1/17</a:t>
+              <a:t>5/2/2017</a:t>
             </a:fld>
             <a:endParaRPr lang="en-US"/>
           </a:p>
@@ -3676,10 +3674,9 @@
           </a:lstStyle>
           <a:p>
             <a:r>
-              <a:rPr lang="en-US" smtClean="0"/>
+              <a:rPr lang="en-US"/>
               <a:t>Click to edit Master title style</a:t>
             </a:r>
-            <a:endParaRPr lang="en-US"/>
           </a:p>
         </p:txBody>
       </p:sp>
@@ -3809,7 +3806,7 @@
           <a:p>
             <a:pPr lvl="0"/>
             <a:r>
-              <a:rPr lang="en-US" smtClean="0"/>
+              <a:rPr lang="en-US"/>
               <a:t>Click to edit Master text styles</a:t>
             </a:r>
           </a:p>
@@ -3840,7 +3837,7 @@
           <a:p>
             <a:fld id="{B4AAAF38-FA28-AC45-9E1F-E60DE1B3F365}" type="datetimeFigureOut">
               <a:rPr lang="en-US" smtClean="0"/>
-              <a:t>5/1/17</a:t>
+              <a:t>5/2/2017</a:t>
             </a:fld>
             <a:endParaRPr lang="en-US"/>
           </a:p>
@@ -3958,10 +3955,9 @@
           <a:lstStyle/>
           <a:p>
             <a:r>
-              <a:rPr lang="en-US" smtClean="0"/>
+              <a:rPr lang="en-US"/>
               <a:t>Click to edit Master title style</a:t>
             </a:r>
-            <a:endParaRPr lang="en-US"/>
           </a:p>
         </p:txBody>
       </p:sp>
@@ -3990,38 +3986,37 @@
           <a:p>
             <a:pPr lvl="0"/>
             <a:r>
-              <a:rPr lang="en-US" smtClean="0"/>
+              <a:rPr lang="en-US"/>
               <a:t>Click to edit Master text styles</a:t>
             </a:r>
           </a:p>
           <a:p>
             <a:pPr lvl="1"/>
             <a:r>
-              <a:rPr lang="en-US" smtClean="0"/>
+              <a:rPr lang="en-US"/>
               <a:t>Second level</a:t>
             </a:r>
           </a:p>
           <a:p>
             <a:pPr lvl="2"/>
             <a:r>
-              <a:rPr lang="en-US" smtClean="0"/>
+              <a:rPr lang="en-US"/>
               <a:t>Third level</a:t>
             </a:r>
           </a:p>
           <a:p>
             <a:pPr lvl="3"/>
             <a:r>
-              <a:rPr lang="en-US" smtClean="0"/>
+              <a:rPr lang="en-US"/>
               <a:t>Fourth level</a:t>
             </a:r>
           </a:p>
           <a:p>
             <a:pPr lvl="4"/>
             <a:r>
-              <a:rPr lang="en-US" smtClean="0"/>
+              <a:rPr lang="en-US"/>
               <a:t>Fifth level</a:t>
             </a:r>
-            <a:endParaRPr lang="en-US"/>
           </a:p>
         </p:txBody>
       </p:sp>
@@ -4050,7 +4045,7 @@
           <a:p>
             <a:fld id="{B4AAAF38-FA28-AC45-9E1F-E60DE1B3F365}" type="datetimeFigureOut">
               <a:rPr lang="en-US" smtClean="0"/>
-              <a:t>5/1/17</a:t>
+              <a:t>5/2/2017</a:t>
             </a:fld>
             <a:endParaRPr lang="en-US"/>
           </a:p>
@@ -4168,10 +4163,9 @@
           <a:lstStyle/>
           <a:p>
             <a:r>
-              <a:rPr lang="en-US" smtClean="0"/>
+              <a:rPr lang="en-US"/>
               <a:t>Click to edit Master title style</a:t>
             </a:r>
-            <a:endParaRPr lang="en-US"/>
           </a:p>
         </p:txBody>
       </p:sp>
@@ -4200,38 +4194,37 @@
           <a:p>
             <a:pPr lvl="0"/>
             <a:r>
-              <a:rPr lang="en-US" smtClean="0"/>
+              <a:rPr lang="en-US"/>
               <a:t>Click to edit Master text styles</a:t>
             </a:r>
           </a:p>
           <a:p>
             <a:pPr lvl="1"/>
             <a:r>
-              <a:rPr lang="en-US" smtClean="0"/>
+              <a:rPr lang="en-US"/>
               <a:t>Second level</a:t>
             </a:r>
           </a:p>
           <a:p>
             <a:pPr lvl="2"/>
             <a:r>
-              <a:rPr lang="en-US" smtClean="0"/>
+              <a:rPr lang="en-US"/>
               <a:t>Third level</a:t>
             </a:r>
           </a:p>
           <a:p>
             <a:pPr lvl="3"/>
             <a:r>
-              <a:rPr lang="en-US" smtClean="0"/>
+              <a:rPr lang="en-US"/>
               <a:t>Fourth level</a:t>
             </a:r>
           </a:p>
           <a:p>
             <a:pPr lvl="4"/>
             <a:r>
-              <a:rPr lang="en-US" smtClean="0"/>
+              <a:rPr lang="en-US"/>
               <a:t>Fifth level</a:t>
             </a:r>
-            <a:endParaRPr lang="en-US"/>
           </a:p>
         </p:txBody>
       </p:sp>
@@ -4260,7 +4253,7 @@
           <a:p>
             <a:fld id="{B4AAAF38-FA28-AC45-9E1F-E60DE1B3F365}" type="datetimeFigureOut">
               <a:rPr lang="en-US" smtClean="0"/>
-              <a:t>5/1/17</a:t>
+              <a:t>5/2/2017</a:t>
             </a:fld>
             <a:endParaRPr lang="en-US"/>
           </a:p>
@@ -4803,7 +4796,7 @@
           <a:p>
             <a:fld id="{B0FE2824-C2A0-4931-BB32-60B24BDBB3CC}" type="datetimeFigureOut">
               <a:rPr lang="en-US" smtClean="0"/>
-              <a:t>5/1/17</a:t>
+              <a:t>5/2/2017</a:t>
             </a:fld>
             <a:endParaRPr lang="en-US"/>
           </a:p>
@@ -5245,7 +5238,7 @@
           <a:p>
             <a:fld id="{B0FE2824-C2A0-4931-BB32-60B24BDBB3CC}" type="datetimeFigureOut">
               <a:rPr lang="en-US" smtClean="0"/>
-              <a:t>5/1/17</a:t>
+              <a:t>5/2/2017</a:t>
             </a:fld>
             <a:endParaRPr lang="en-US"/>
           </a:p>
@@ -5374,7 +5367,7 @@
           <a:p>
             <a:fld id="{B0FE2824-C2A0-4931-BB32-60B24BDBB3CC}" type="datetimeFigureOut">
               <a:rPr lang="en-US" smtClean="0"/>
-              <a:t>5/1/17</a:t>
+              <a:t>5/2/2017</a:t>
             </a:fld>
             <a:endParaRPr lang="en-US"/>
           </a:p>
@@ -5481,7 +5474,7 @@
           <a:p>
             <a:fld id="{B0FE2824-C2A0-4931-BB32-60B24BDBB3CC}" type="datetimeFigureOut">
               <a:rPr lang="en-US" smtClean="0"/>
-              <a:t>5/1/17</a:t>
+              <a:t>5/2/2017</a:t>
             </a:fld>
             <a:endParaRPr lang="en-US"/>
           </a:p>
@@ -5777,7 +5770,7 @@
           <a:p>
             <a:fld id="{B0FE2824-C2A0-4931-BB32-60B24BDBB3CC}" type="datetimeFigureOut">
               <a:rPr lang="en-US" smtClean="0"/>
-              <a:t>5/1/17</a:t>
+              <a:t>5/2/2017</a:t>
             </a:fld>
             <a:endParaRPr lang="en-US"/>
           </a:p>
@@ -6050,7 +6043,7 @@
           <a:p>
             <a:fld id="{B0FE2824-C2A0-4931-BB32-60B24BDBB3CC}" type="datetimeFigureOut">
               <a:rPr lang="en-US" smtClean="0"/>
-              <a:t>5/1/17</a:t>
+              <a:t>5/2/2017</a:t>
             </a:fld>
             <a:endParaRPr lang="en-US"/>
           </a:p>
@@ -6344,7 +6337,7 @@
             <a:fld id="{B0FE2824-C2A0-4931-BB32-60B24BDBB3CC}" type="datetimeFigureOut">
               <a:rPr lang="en-US" smtClean="0"/>
               <a:pPr/>
-              <a:t>5/1/17</a:t>
+              <a:t>5/2/2017</a:t>
             </a:fld>
             <a:endParaRPr lang="en-US"/>
           </a:p>
@@ -6735,7 +6728,7 @@
   </p:txStyles>
   <p:extLst mod="1">
     <p:ext uri="{27BBF7A9-308A-43DC-89C8-2F10F3537804}">
-      <p15:sldGuideLst xmlns="" xmlns:p15="http://schemas.microsoft.com/office/powerpoint/2012/main">
+      <p15:sldGuideLst xmlns:p15="http://schemas.microsoft.com/office/powerpoint/2012/main">
         <p15:guide id="1" pos="3840" userDrawn="1">
           <p15:clr>
             <a:srgbClr val="F26B43"/>
@@ -7136,21 +7129,7 @@
                 <a:latin typeface="Helvetica"/>
                 <a:cs typeface="Helvetica"/>
               </a:rPr>
-              <a:t>, Lei Qian, Megan Robertson, </a:t>
-            </a:r>
-            <a:r>
-              <a:rPr lang="en-US" dirty="0" smtClean="0">
-                <a:latin typeface="Helvetica"/>
-                <a:cs typeface="Helvetica"/>
-              </a:rPr>
-              <a:t>and Reuben </a:t>
-            </a:r>
-            <a:r>
-              <a:rPr lang="en-US" dirty="0">
-                <a:latin typeface="Helvetica"/>
-                <a:cs typeface="Helvetica"/>
-              </a:rPr>
-              <a:t>McCreanor</a:t>
+              <a:t>, Lei Qian, Megan Robertson, and Reuben McCreanor</a:t>
             </a:r>
           </a:p>
           <a:p>
@@ -7186,13 +7165,6 @@
       </p:transition>
     </mc:Fallback>
   </mc:AlternateContent>
-  <p:timing>
-    <p:tnLst>
-      <p:par>
-        <p:cTn xmlns:p14="http://schemas.microsoft.com/office/powerpoint/2010/main" id="1" dur="indefinite" restart="never" nodeType="tmRoot"/>
-      </p:par>
-    </p:tnLst>
-  </p:timing>
 </p:sld>
 </file>
 
@@ -7251,29 +7223,8 @@
                 <a:latin typeface="Helvetica"/>
                 <a:cs typeface="Helvetica"/>
               </a:rPr>
-              <a:t>South Side - ARIMA(4,0,0)x(1,0,0)[12</a:t>
-            </a:r>
-            <a:r>
-              <a:rPr lang="en-US" dirty="0" smtClean="0">
-                <a:solidFill>
-                  <a:schemeClr val="accent6">
-                    <a:lumMod val="75000"/>
-                  </a:schemeClr>
-                </a:solidFill>
-                <a:latin typeface="Helvetica"/>
-                <a:cs typeface="Helvetica"/>
-              </a:rPr>
-              <a:t>], cont.</a:t>
-            </a:r>
-            <a:endParaRPr lang="en-US" dirty="0">
-              <a:solidFill>
-                <a:schemeClr val="accent6">
-                  <a:lumMod val="75000"/>
-                </a:schemeClr>
-              </a:solidFill>
-              <a:latin typeface="Helvetica"/>
-              <a:cs typeface="Helvetica"/>
-            </a:endParaRPr>
+              <a:t>South Side - ARIMA(4,0,0)x(1,0,0)[12], cont.</a:t>
+            </a:r>
           </a:p>
         </p:txBody>
       </p:sp>
@@ -7357,13 +7308,6 @@
       </p:transition>
     </mc:Fallback>
   </mc:AlternateContent>
-  <p:timing>
-    <p:tnLst>
-      <p:par>
-        <p:cTn xmlns:p14="http://schemas.microsoft.com/office/powerpoint/2010/main" id="1" dur="indefinite" restart="never" nodeType="tmRoot"/>
-      </p:par>
-    </p:tnLst>
-  </p:timing>
 </p:sld>
 </file>
 
@@ -7405,18 +7349,11 @@
           <a:lstStyle/>
           <a:p>
             <a:r>
-              <a:rPr lang="en-US" dirty="0" smtClean="0">
-                <a:latin typeface="Helvetica"/>
-                <a:cs typeface="Helvetica"/>
-              </a:rPr>
-              <a:t>Bayesian Regression </a:t>
-            </a:r>
-            <a:r>
               <a:rPr lang="en-US" dirty="0">
                 <a:latin typeface="Helvetica"/>
                 <a:cs typeface="Helvetica"/>
               </a:rPr>
-              <a:t>Modeling</a:t>
+              <a:t>Bayesian Regression Modeling</a:t>
             </a:r>
           </a:p>
         </p:txBody>
@@ -7442,16 +7379,12 @@
           <a:lstStyle/>
           <a:p>
             <a:r>
-              <a:rPr lang="en-US" dirty="0" smtClean="0">
+              <a:rPr lang="en-US" dirty="0">
                 <a:latin typeface="Helvetica"/>
                 <a:cs typeface="Helvetica"/>
               </a:rPr>
               <a:t>A spatial analysis of crime data</a:t>
             </a:r>
-            <a:endParaRPr lang="en-US" dirty="0">
-              <a:latin typeface="Helvetica"/>
-              <a:cs typeface="Helvetica"/>
-            </a:endParaRPr>
           </a:p>
         </p:txBody>
       </p:sp>
@@ -7477,13 +7410,6 @@
       </p:transition>
     </mc:Fallback>
   </mc:AlternateContent>
-  <p:timing>
-    <p:tnLst>
-      <p:par>
-        <p:cTn xmlns:p14="http://schemas.microsoft.com/office/powerpoint/2010/main" id="1" dur="indefinite" restart="never" nodeType="tmRoot"/>
-      </p:par>
-    </p:tnLst>
-  </p:timing>
 </p:sld>
 </file>
 
@@ -7522,43 +7448,31 @@
             <p:ph type="title"/>
           </p:nvPr>
         </p:nvSpPr>
-        <p:spPr>
-          <a:xfrm>
-            <a:off x="838200" y="-76200"/>
-            <a:ext cx="10515600" cy="1145224"/>
-          </a:xfrm>
-        </p:spPr>
-        <p:txBody>
-          <a:bodyPr/>
-          <a:lstStyle/>
-          <a:p>
-            <a:r>
-              <a:rPr lang="en-US" dirty="0" smtClean="0">
+        <p:spPr/>
+        <p:txBody>
+          <a:bodyPr/>
+          <a:lstStyle/>
+          <a:p>
+            <a:r>
+              <a:rPr lang="en-US" dirty="0">
                 <a:solidFill>
-                  <a:schemeClr val="accent6">
-                    <a:lumMod val="75000"/>
-                  </a:schemeClr>
+                  <a:srgbClr val="736756"/>
                 </a:solidFill>
                 <a:latin typeface="Helvetica"/>
                 <a:cs typeface="Helvetica"/>
               </a:rPr>
-              <a:t>LASSO Regression Model</a:t>
+              <a:t>Poisson Likelihood Model</a:t>
             </a:r>
             <a:endParaRPr lang="en-US" dirty="0">
-              <a:solidFill>
-                <a:schemeClr val="accent6">
-                  <a:lumMod val="75000"/>
-                </a:schemeClr>
-              </a:solidFill>
-              <a:latin typeface="Helvetica"/>
-              <a:cs typeface="Helvetica"/>
+              <a:latin typeface="Helvetica" panose="020B0604020202020204" pitchFamily="34" charset="0"/>
+              <a:cs typeface="Helvetica" panose="020B0604020202020204" pitchFamily="34" charset="0"/>
             </a:endParaRPr>
           </a:p>
         </p:txBody>
       </p:sp>
       <p:pic>
         <p:nvPicPr>
-          <p:cNvPr id="8" name="Picture 7"/>
+          <p:cNvPr id="5" name="Picture 4"/>
           <p:cNvPicPr>
             <a:picLocks noChangeAspect="1"/>
           </p:cNvPicPr>
@@ -7572,8 +7486,8 @@
         </p:blipFill>
         <p:spPr>
           <a:xfrm>
-            <a:off x="762000" y="1391105"/>
-            <a:ext cx="10820400" cy="4857295"/>
+            <a:off x="1638300" y="1828800"/>
+            <a:ext cx="8915400" cy="3328675"/>
           </a:xfrm>
           <a:prstGeom prst="rect">
             <a:avLst/>
@@ -7583,7 +7497,7 @@
     </p:spTree>
     <p:extLst>
       <p:ext uri="{BB962C8B-B14F-4D97-AF65-F5344CB8AC3E}">
-        <p14:creationId xmlns:p14="http://schemas.microsoft.com/office/powerpoint/2010/main" val="1159850092"/>
+        <p14:creationId xmlns:p14="http://schemas.microsoft.com/office/powerpoint/2010/main" val="1774154672"/>
       </p:ext>
     </p:extLst>
   </p:cSld>
@@ -7602,13 +7516,6 @@
       </p:transition>
     </mc:Fallback>
   </mc:AlternateContent>
-  <p:timing>
-    <p:tnLst>
-      <p:par>
-        <p:cTn xmlns:p14="http://schemas.microsoft.com/office/powerpoint/2010/main" id="1" dur="indefinite" restart="never" nodeType="tmRoot"/>
-      </p:par>
-    </p:tnLst>
-  </p:timing>
 </p:sld>
 </file>
 
@@ -7649,6 +7556,115 @@
         </p:nvSpPr>
         <p:spPr>
           <a:xfrm>
+            <a:off x="838200" y="-76200"/>
+            <a:ext cx="10515600" cy="1145224"/>
+          </a:xfrm>
+        </p:spPr>
+        <p:txBody>
+          <a:bodyPr/>
+          <a:lstStyle/>
+          <a:p>
+            <a:r>
+              <a:rPr lang="en-US" dirty="0">
+                <a:solidFill>
+                  <a:schemeClr val="accent6">
+                    <a:lumMod val="75000"/>
+                  </a:schemeClr>
+                </a:solidFill>
+                <a:latin typeface="Helvetica"/>
+                <a:cs typeface="Helvetica"/>
+              </a:rPr>
+              <a:t>LASSO Regression Model</a:t>
+            </a:r>
+          </a:p>
+        </p:txBody>
+      </p:sp>
+      <p:pic>
+        <p:nvPicPr>
+          <p:cNvPr id="5" name="Picture 4"/>
+          <p:cNvPicPr>
+            <a:picLocks noChangeAspect="1"/>
+          </p:cNvPicPr>
+          <p:nvPr/>
+        </p:nvPicPr>
+        <p:blipFill>
+          <a:blip r:embed="rId2"/>
+          <a:stretch>
+            <a:fillRect/>
+          </a:stretch>
+        </p:blipFill>
+        <p:spPr>
+          <a:xfrm>
+            <a:off x="1923540" y="1447800"/>
+            <a:ext cx="8344920" cy="4264976"/>
+          </a:xfrm>
+          <a:prstGeom prst="rect">
+            <a:avLst/>
+          </a:prstGeom>
+        </p:spPr>
+      </p:pic>
+    </p:spTree>
+    <p:extLst>
+      <p:ext uri="{BB962C8B-B14F-4D97-AF65-F5344CB8AC3E}">
+        <p14:creationId xmlns:p14="http://schemas.microsoft.com/office/powerpoint/2010/main" val="1159850092"/>
+      </p:ext>
+    </p:extLst>
+  </p:cSld>
+  <p:clrMapOvr>
+    <a:masterClrMapping/>
+  </p:clrMapOvr>
+  <mc:AlternateContent xmlns:mc="http://schemas.openxmlformats.org/markup-compatibility/2006" xmlns:p14="http://schemas.microsoft.com/office/powerpoint/2010/main">
+    <mc:Choice Requires="p14">
+      <p:transition spd="med" p14:dur="700">
+        <p:fade/>
+      </p:transition>
+    </mc:Choice>
+    <mc:Fallback xmlns="">
+      <p:transition spd="med">
+        <p:fade/>
+      </p:transition>
+    </mc:Fallback>
+  </mc:AlternateContent>
+</p:sld>
+</file>
+
+<file path=ppt/slides/slide14.xml><?xml version="1.0" encoding="utf-8"?>
+<p:sld xmlns:a="http://schemas.openxmlformats.org/drawingml/2006/main" xmlns:r="http://schemas.openxmlformats.org/officeDocument/2006/relationships" xmlns:p="http://schemas.openxmlformats.org/presentationml/2006/main">
+  <p:cSld>
+    <p:bg>
+      <p:bgPr>
+        <a:solidFill>
+          <a:schemeClr val="tx1"/>
+        </a:solidFill>
+        <a:effectLst/>
+      </p:bgPr>
+    </p:bg>
+    <p:spTree>
+      <p:nvGrpSpPr>
+        <p:cNvPr id="1" name=""/>
+        <p:cNvGrpSpPr/>
+        <p:nvPr/>
+      </p:nvGrpSpPr>
+      <p:grpSpPr>
+        <a:xfrm>
+          <a:off x="0" y="0"/>
+          <a:ext cx="0" cy="0"/>
+          <a:chOff x="0" y="0"/>
+          <a:chExt cx="0" cy="0"/>
+        </a:xfrm>
+      </p:grpSpPr>
+      <p:sp>
+        <p:nvSpPr>
+          <p:cNvPr id="2" name="Title 1"/>
+          <p:cNvSpPr>
+            <a:spLocks noGrp="1"/>
+          </p:cNvSpPr>
+          <p:nvPr>
+            <p:ph type="title"/>
+          </p:nvPr>
+        </p:nvSpPr>
+        <p:spPr>
+          <a:xfrm>
             <a:off x="381000" y="-76200"/>
             <a:ext cx="10515600" cy="1145224"/>
           </a:xfrm>
@@ -7658,7 +7674,7 @@
           <a:lstStyle/>
           <a:p>
             <a:r>
-              <a:rPr lang="en-US" dirty="0" smtClean="0">
+              <a:rPr lang="en-US" dirty="0">
                 <a:solidFill>
                   <a:srgbClr val="736756"/>
                 </a:solidFill>
@@ -7667,13 +7683,6 @@
               </a:rPr>
               <a:t>Penalized Spatial Regression Model</a:t>
             </a:r>
-            <a:endParaRPr lang="en-US" dirty="0">
-              <a:solidFill>
-                <a:srgbClr val="736756"/>
-              </a:solidFill>
-              <a:latin typeface="Helvetica"/>
-              <a:cs typeface="Helvetica"/>
-            </a:endParaRPr>
           </a:p>
         </p:txBody>
       </p:sp>
@@ -7747,17 +7756,10 @@
       </p:transition>
     </mc:Fallback>
   </mc:AlternateContent>
-  <p:timing>
-    <p:tnLst>
-      <p:par>
-        <p:cTn xmlns:p14="http://schemas.microsoft.com/office/powerpoint/2010/main" id="1" dur="indefinite" restart="never" nodeType="tmRoot"/>
-      </p:par>
-    </p:tnLst>
-  </p:timing>
 </p:sld>
 </file>
 
-<file path=ppt/slides/slide14.xml><?xml version="1.0" encoding="utf-8"?>
+<file path=ppt/slides/slide15.xml><?xml version="1.0" encoding="utf-8"?>
 <p:sld xmlns:a="http://schemas.openxmlformats.org/drawingml/2006/main" xmlns:r="http://schemas.openxmlformats.org/officeDocument/2006/relationships" xmlns:p="http://schemas.openxmlformats.org/presentationml/2006/main">
   <p:cSld>
     <p:bg>
@@ -7827,7 +7829,7 @@
           <a:lstStyle/>
           <a:p>
             <a:r>
-              <a:rPr lang="en-US" dirty="0" smtClean="0">
+              <a:rPr lang="en-US" dirty="0">
                 <a:solidFill>
                   <a:srgbClr val="736756"/>
                 </a:solidFill>
@@ -7836,13 +7838,6 @@
               </a:rPr>
               <a:t>Results</a:t>
             </a:r>
-            <a:endParaRPr lang="en-US" dirty="0">
-              <a:solidFill>
-                <a:srgbClr val="736756"/>
-              </a:solidFill>
-              <a:latin typeface="Helvetica"/>
-              <a:cs typeface="Helvetica"/>
-            </a:endParaRPr>
           </a:p>
         </p:txBody>
       </p:sp>
@@ -7868,424 +7863,6 @@
       </p:transition>
     </mc:Fallback>
   </mc:AlternateContent>
-  <p:timing>
-    <p:tnLst>
-      <p:par>
-        <p:cTn xmlns:p14="http://schemas.microsoft.com/office/powerpoint/2010/main" id="1" dur="indefinite" restart="never" nodeType="tmRoot"/>
-      </p:par>
-    </p:tnLst>
-  </p:timing>
-</p:sld>
-</file>
-
-<file path=ppt/slides/slide15.xml><?xml version="1.0" encoding="utf-8"?>
-<p:sld xmlns:a="http://schemas.openxmlformats.org/drawingml/2006/main" xmlns:r="http://schemas.openxmlformats.org/officeDocument/2006/relationships" xmlns:p="http://schemas.openxmlformats.org/presentationml/2006/main">
-  <p:cSld>
-    <p:bg>
-      <p:bgPr>
-        <a:solidFill>
-          <a:schemeClr val="tx1"/>
-        </a:solidFill>
-        <a:effectLst/>
-      </p:bgPr>
-    </p:bg>
-    <p:spTree>
-      <p:nvGrpSpPr>
-        <p:cNvPr id="1" name=""/>
-        <p:cNvGrpSpPr/>
-        <p:nvPr/>
-      </p:nvGrpSpPr>
-      <p:grpSpPr>
-        <a:xfrm>
-          <a:off x="0" y="0"/>
-          <a:ext cx="0" cy="0"/>
-          <a:chOff x="0" y="0"/>
-          <a:chExt cx="0" cy="0"/>
-        </a:xfrm>
-      </p:grpSpPr>
-      <p:pic>
-        <p:nvPicPr>
-          <p:cNvPr id="6" name="Picture 5"/>
-          <p:cNvPicPr>
-            <a:picLocks noChangeAspect="1"/>
-          </p:cNvPicPr>
-          <p:nvPr/>
-        </p:nvPicPr>
-        <p:blipFill>
-          <a:blip r:embed="rId2"/>
-          <a:stretch>
-            <a:fillRect/>
-          </a:stretch>
-        </p:blipFill>
-        <p:spPr>
-          <a:xfrm>
-            <a:off x="3886200" y="152400"/>
-            <a:ext cx="8153400" cy="6172200"/>
-          </a:xfrm>
-          <a:prstGeom prst="rect">
-            <a:avLst/>
-          </a:prstGeom>
-        </p:spPr>
-      </p:pic>
-      <p:sp>
-        <p:nvSpPr>
-          <p:cNvPr id="8" name="TextBox 7"/>
-          <p:cNvSpPr txBox="1"/>
-          <p:nvPr/>
-        </p:nvSpPr>
-        <p:spPr>
-          <a:xfrm>
-            <a:off x="381000" y="838200"/>
-            <a:ext cx="3048000" cy="923330"/>
-          </a:xfrm>
-          <a:prstGeom prst="rect">
-            <a:avLst/>
-          </a:prstGeom>
-          <a:noFill/>
-        </p:spPr>
-        <p:txBody>
-          <a:bodyPr wrap="square" rtlCol="0">
-            <a:spAutoFit/>
-          </a:bodyPr>
-          <a:lstStyle/>
-          <a:p>
-            <a:r>
-              <a:rPr lang="en-US" b="1" dirty="0" smtClean="0">
-                <a:solidFill>
-                  <a:schemeClr val="bg1"/>
-                </a:solidFill>
-                <a:latin typeface="Helvetica"/>
-                <a:cs typeface="Helvetica"/>
-              </a:rPr>
-              <a:t>RMSE Values</a:t>
-            </a:r>
-          </a:p>
-          <a:p>
-            <a:endParaRPr lang="en-US" b="1" dirty="0">
-              <a:solidFill>
-                <a:schemeClr val="bg1"/>
-              </a:solidFill>
-              <a:latin typeface="Helvetica"/>
-              <a:cs typeface="Helvetica"/>
-            </a:endParaRPr>
-          </a:p>
-          <a:p>
-            <a:endParaRPr lang="en-US" b="1" dirty="0">
-              <a:solidFill>
-                <a:schemeClr val="bg1"/>
-              </a:solidFill>
-              <a:latin typeface="Helvetica"/>
-              <a:cs typeface="Helvetica"/>
-            </a:endParaRPr>
-          </a:p>
-        </p:txBody>
-      </p:sp>
-      <p:graphicFrame>
-        <p:nvGraphicFramePr>
-          <p:cNvPr id="9" name="Table 8"/>
-          <p:cNvGraphicFramePr>
-            <a:graphicFrameLocks noGrp="1"/>
-          </p:cNvGraphicFramePr>
-          <p:nvPr>
-            <p:extLst>
-              <p:ext uri="{D42A27DB-BD31-4B8C-83A1-F6EECF244321}">
-                <p14:modId xmlns:p14="http://schemas.microsoft.com/office/powerpoint/2010/main" val="1778084285"/>
-              </p:ext>
-            </p:extLst>
-          </p:nvPr>
-        </p:nvGraphicFramePr>
-        <p:xfrm>
-          <a:off x="457200" y="1295400"/>
-          <a:ext cx="3124200" cy="838200"/>
-        </p:xfrm>
-        <a:graphic>
-          <a:graphicData uri="http://schemas.openxmlformats.org/drawingml/2006/table">
-            <a:tbl>
-              <a:tblPr firstRow="1" bandRow="1">
-                <a:tableStyleId>{3B4B98B0-60AC-42C2-AFA5-B58CD77FA1E5}</a:tableStyleId>
-              </a:tblPr>
-              <a:tblGrid>
-                <a:gridCol w="1524000"/>
-                <a:gridCol w="1600200"/>
-              </a:tblGrid>
-              <a:tr h="419100">
-                <a:tc>
-                  <a:txBody>
-                    <a:bodyPr/>
-                    <a:lstStyle/>
-                    <a:p>
-                      <a:r>
-                        <a:rPr lang="en-US" b="1" dirty="0" smtClean="0">
-                          <a:solidFill>
-                            <a:srgbClr val="3D372E"/>
-                          </a:solidFill>
-                          <a:latin typeface="Helvetica"/>
-                          <a:cs typeface="Helvetica"/>
-                        </a:rPr>
-                        <a:t>Spatial</a:t>
-                      </a:r>
-                      <a:endParaRPr lang="en-US" b="1" dirty="0">
-                        <a:solidFill>
-                          <a:srgbClr val="3D372E"/>
-                        </a:solidFill>
-                        <a:latin typeface="Helvetica"/>
-                        <a:cs typeface="Helvetica"/>
-                      </a:endParaRPr>
-                    </a:p>
-                  </a:txBody>
-                  <a:tcPr/>
-                </a:tc>
-                <a:tc>
-                  <a:txBody>
-                    <a:bodyPr/>
-                    <a:lstStyle/>
-                    <a:p>
-                      <a:r>
-                        <a:rPr lang="en-US" b="1" dirty="0" smtClean="0">
-                          <a:solidFill>
-                            <a:srgbClr val="3D372E"/>
-                          </a:solidFill>
-                          <a:latin typeface="Helvetica"/>
-                          <a:cs typeface="Helvetica"/>
-                        </a:rPr>
-                        <a:t>3.65</a:t>
-                      </a:r>
-                      <a:endParaRPr lang="en-US" b="1" dirty="0">
-                        <a:solidFill>
-                          <a:srgbClr val="3D372E"/>
-                        </a:solidFill>
-                        <a:latin typeface="Helvetica"/>
-                        <a:cs typeface="Helvetica"/>
-                      </a:endParaRPr>
-                    </a:p>
-                  </a:txBody>
-                  <a:tcPr/>
-                </a:tc>
-              </a:tr>
-              <a:tr h="419100">
-                <a:tc>
-                  <a:txBody>
-                    <a:bodyPr/>
-                    <a:lstStyle/>
-                    <a:p>
-                      <a:r>
-                        <a:rPr lang="en-US" b="1" dirty="0" smtClean="0">
-                          <a:solidFill>
-                            <a:srgbClr val="3D372E"/>
-                          </a:solidFill>
-                          <a:latin typeface="Helvetica"/>
-                          <a:cs typeface="Helvetica"/>
-                        </a:rPr>
-                        <a:t>LASSO</a:t>
-                      </a:r>
-                      <a:endParaRPr lang="en-US" b="1" dirty="0">
-                        <a:solidFill>
-                          <a:srgbClr val="3D372E"/>
-                        </a:solidFill>
-                        <a:latin typeface="Helvetica"/>
-                        <a:cs typeface="Helvetica"/>
-                      </a:endParaRPr>
-                    </a:p>
-                  </a:txBody>
-                  <a:tcPr/>
-                </a:tc>
-                <a:tc>
-                  <a:txBody>
-                    <a:bodyPr/>
-                    <a:lstStyle/>
-                    <a:p>
-                      <a:r>
-                        <a:rPr lang="en-US" b="1" dirty="0" smtClean="0">
-                          <a:solidFill>
-                            <a:srgbClr val="3D372E"/>
-                          </a:solidFill>
-                          <a:latin typeface="Helvetica"/>
-                          <a:cs typeface="Helvetica"/>
-                        </a:rPr>
-                        <a:t>252.43</a:t>
-                      </a:r>
-                      <a:endParaRPr lang="en-US" b="1" dirty="0">
-                        <a:solidFill>
-                          <a:srgbClr val="3D372E"/>
-                        </a:solidFill>
-                        <a:latin typeface="Helvetica"/>
-                        <a:cs typeface="Helvetica"/>
-                      </a:endParaRPr>
-                    </a:p>
-                  </a:txBody>
-                  <a:tcPr/>
-                </a:tc>
-              </a:tr>
-            </a:tbl>
-          </a:graphicData>
-        </a:graphic>
-      </p:graphicFrame>
-      <p:sp>
-        <p:nvSpPr>
-          <p:cNvPr id="10" name="TextBox 9"/>
-          <p:cNvSpPr txBox="1"/>
-          <p:nvPr/>
-        </p:nvSpPr>
-        <p:spPr>
-          <a:xfrm>
-            <a:off x="457200" y="2590800"/>
-            <a:ext cx="3048000" cy="646331"/>
-          </a:xfrm>
-          <a:prstGeom prst="rect">
-            <a:avLst/>
-          </a:prstGeom>
-          <a:noFill/>
-        </p:spPr>
-        <p:txBody>
-          <a:bodyPr wrap="square" rtlCol="0">
-            <a:spAutoFit/>
-          </a:bodyPr>
-          <a:lstStyle/>
-          <a:p>
-            <a:r>
-              <a:rPr lang="en-US" b="1" dirty="0" smtClean="0">
-                <a:solidFill>
-                  <a:schemeClr val="bg1"/>
-                </a:solidFill>
-                <a:latin typeface="Helvetica"/>
-                <a:cs typeface="Helvetica"/>
-              </a:rPr>
-              <a:t>Moran’s I</a:t>
-            </a:r>
-            <a:endParaRPr lang="en-US" b="1" dirty="0">
-              <a:solidFill>
-                <a:schemeClr val="bg1"/>
-              </a:solidFill>
-              <a:latin typeface="Helvetica"/>
-              <a:cs typeface="Helvetica"/>
-            </a:endParaRPr>
-          </a:p>
-          <a:p>
-            <a:endParaRPr lang="en-US" b="1" dirty="0">
-              <a:solidFill>
-                <a:schemeClr val="bg1"/>
-              </a:solidFill>
-              <a:latin typeface="Helvetica"/>
-              <a:cs typeface="Helvetica"/>
-            </a:endParaRPr>
-          </a:p>
-        </p:txBody>
-      </p:sp>
-      <p:graphicFrame>
-        <p:nvGraphicFramePr>
-          <p:cNvPr id="11" name="Table 10"/>
-          <p:cNvGraphicFramePr>
-            <a:graphicFrameLocks noGrp="1"/>
-          </p:cNvGraphicFramePr>
-          <p:nvPr>
-            <p:extLst>
-              <p:ext uri="{D42A27DB-BD31-4B8C-83A1-F6EECF244321}">
-                <p14:modId xmlns:p14="http://schemas.microsoft.com/office/powerpoint/2010/main" val="2109355968"/>
-              </p:ext>
-            </p:extLst>
-          </p:nvPr>
-        </p:nvGraphicFramePr>
-        <p:xfrm>
-          <a:off x="533400" y="3048000"/>
-          <a:ext cx="3124200" cy="419100"/>
-        </p:xfrm>
-        <a:graphic>
-          <a:graphicData uri="http://schemas.openxmlformats.org/drawingml/2006/table">
-            <a:tbl>
-              <a:tblPr firstRow="1" bandRow="1">
-                <a:tableStyleId>{3B4B98B0-60AC-42C2-AFA5-B58CD77FA1E5}</a:tableStyleId>
-              </a:tblPr>
-              <a:tblGrid>
-                <a:gridCol w="1524000"/>
-                <a:gridCol w="1600200"/>
-              </a:tblGrid>
-              <a:tr h="419100">
-                <a:tc>
-                  <a:txBody>
-                    <a:bodyPr/>
-                    <a:lstStyle/>
-                    <a:p>
-                      <a:r>
-                        <a:rPr lang="en-US" b="1" dirty="0" smtClean="0">
-                          <a:solidFill>
-                            <a:srgbClr val="3D372E"/>
-                          </a:solidFill>
-                          <a:latin typeface="Helvetica"/>
-                          <a:cs typeface="Helvetica"/>
-                        </a:rPr>
-                        <a:t>Spatial</a:t>
-                      </a:r>
-                      <a:endParaRPr lang="en-US" b="1" dirty="0">
-                        <a:solidFill>
-                          <a:srgbClr val="3D372E"/>
-                        </a:solidFill>
-                        <a:latin typeface="Helvetica"/>
-                        <a:cs typeface="Helvetica"/>
-                      </a:endParaRPr>
-                    </a:p>
-                  </a:txBody>
-                  <a:tcPr/>
-                </a:tc>
-                <a:tc>
-                  <a:txBody>
-                    <a:bodyPr/>
-                    <a:lstStyle/>
-                    <a:p>
-                      <a:r>
-                        <a:rPr lang="en-US" b="1" dirty="0" smtClean="0">
-                          <a:solidFill>
-                            <a:srgbClr val="3D372E"/>
-                          </a:solidFill>
-                          <a:latin typeface="Helvetica"/>
-                          <a:cs typeface="Helvetica"/>
-                        </a:rPr>
-                        <a:t>0.51</a:t>
-                      </a:r>
-                      <a:endParaRPr lang="en-US" b="1" dirty="0">
-                        <a:solidFill>
-                          <a:srgbClr val="3D372E"/>
-                        </a:solidFill>
-                        <a:latin typeface="Helvetica"/>
-                        <a:cs typeface="Helvetica"/>
-                      </a:endParaRPr>
-                    </a:p>
-                  </a:txBody>
-                  <a:tcPr/>
-                </a:tc>
-              </a:tr>
-            </a:tbl>
-          </a:graphicData>
-        </a:graphic>
-      </p:graphicFrame>
-    </p:spTree>
-    <p:extLst>
-      <p:ext uri="{BB962C8B-B14F-4D97-AF65-F5344CB8AC3E}">
-        <p14:creationId xmlns:p14="http://schemas.microsoft.com/office/powerpoint/2010/main" val="680897231"/>
-      </p:ext>
-    </p:extLst>
-  </p:cSld>
-  <p:clrMapOvr>
-    <a:masterClrMapping/>
-  </p:clrMapOvr>
-  <mc:AlternateContent xmlns:mc="http://schemas.openxmlformats.org/markup-compatibility/2006" xmlns:p14="http://schemas.microsoft.com/office/powerpoint/2010/main">
-    <mc:Choice Requires="p14">
-      <p:transition spd="med" p14:dur="700">
-        <p:fade/>
-      </p:transition>
-    </mc:Choice>
-    <mc:Fallback xmlns="">
-      <p:transition spd="med">
-        <p:fade/>
-      </p:transition>
-    </mc:Fallback>
-  </mc:AlternateContent>
-  <p:timing>
-    <p:tnLst>
-      <p:par>
-        <p:cTn xmlns:p14="http://schemas.microsoft.com/office/powerpoint/2010/main" id="1" dur="indefinite" restart="never" nodeType="tmRoot"/>
-      </p:par>
-    </p:tnLst>
-  </p:timing>
 </p:sld>
 </file>
 
@@ -8316,6 +7893,400 @@
       </p:grpSpPr>
       <p:sp>
         <p:nvSpPr>
+          <p:cNvPr id="8" name="TextBox 7"/>
+          <p:cNvSpPr txBox="1"/>
+          <p:nvPr/>
+        </p:nvSpPr>
+        <p:spPr>
+          <a:xfrm>
+            <a:off x="381000" y="838200"/>
+            <a:ext cx="3048000" cy="923330"/>
+          </a:xfrm>
+          <a:prstGeom prst="rect">
+            <a:avLst/>
+          </a:prstGeom>
+          <a:noFill/>
+        </p:spPr>
+        <p:txBody>
+          <a:bodyPr wrap="square" rtlCol="0">
+            <a:spAutoFit/>
+          </a:bodyPr>
+          <a:lstStyle/>
+          <a:p>
+            <a:r>
+              <a:rPr lang="en-US" b="1" dirty="0">
+                <a:solidFill>
+                  <a:schemeClr val="bg1"/>
+                </a:solidFill>
+                <a:latin typeface="Helvetica"/>
+                <a:cs typeface="Helvetica"/>
+              </a:rPr>
+              <a:t>RMSE Values</a:t>
+            </a:r>
+          </a:p>
+          <a:p>
+            <a:endParaRPr lang="en-US" b="1" dirty="0">
+              <a:solidFill>
+                <a:schemeClr val="bg1"/>
+              </a:solidFill>
+              <a:latin typeface="Helvetica"/>
+              <a:cs typeface="Helvetica"/>
+            </a:endParaRPr>
+          </a:p>
+          <a:p>
+            <a:endParaRPr lang="en-US" b="1" dirty="0">
+              <a:solidFill>
+                <a:schemeClr val="bg1"/>
+              </a:solidFill>
+              <a:latin typeface="Helvetica"/>
+              <a:cs typeface="Helvetica"/>
+            </a:endParaRPr>
+          </a:p>
+        </p:txBody>
+      </p:sp>
+      <p:graphicFrame>
+        <p:nvGraphicFramePr>
+          <p:cNvPr id="9" name="Table 8"/>
+          <p:cNvGraphicFramePr>
+            <a:graphicFrameLocks noGrp="1"/>
+          </p:cNvGraphicFramePr>
+          <p:nvPr>
+            <p:extLst>
+              <p:ext uri="{D42A27DB-BD31-4B8C-83A1-F6EECF244321}">
+                <p14:modId xmlns:p14="http://schemas.microsoft.com/office/powerpoint/2010/main" val="1778084285"/>
+              </p:ext>
+            </p:extLst>
+          </p:nvPr>
+        </p:nvGraphicFramePr>
+        <p:xfrm>
+          <a:off x="457200" y="1295400"/>
+          <a:ext cx="3124200" cy="838200"/>
+        </p:xfrm>
+        <a:graphic>
+          <a:graphicData uri="http://schemas.openxmlformats.org/drawingml/2006/table">
+            <a:tbl>
+              <a:tblPr firstRow="1" bandRow="1">
+                <a:tableStyleId>{3B4B98B0-60AC-42C2-AFA5-B58CD77FA1E5}</a:tableStyleId>
+              </a:tblPr>
+              <a:tblGrid>
+                <a:gridCol w="1524000">
+                  <a:extLst>
+                    <a:ext uri="{9D8B030D-6E8A-4147-A177-3AD203B41FA5}">
+                      <a16:colId xmlns:a16="http://schemas.microsoft.com/office/drawing/2014/main" val="20000"/>
+                    </a:ext>
+                  </a:extLst>
+                </a:gridCol>
+                <a:gridCol w="1600200">
+                  <a:extLst>
+                    <a:ext uri="{9D8B030D-6E8A-4147-A177-3AD203B41FA5}">
+                      <a16:colId xmlns:a16="http://schemas.microsoft.com/office/drawing/2014/main" val="20001"/>
+                    </a:ext>
+                  </a:extLst>
+                </a:gridCol>
+              </a:tblGrid>
+              <a:tr h="419100">
+                <a:tc>
+                  <a:txBody>
+                    <a:bodyPr/>
+                    <a:lstStyle/>
+                    <a:p>
+                      <a:r>
+                        <a:rPr lang="en-US" b="1" dirty="0">
+                          <a:solidFill>
+                            <a:srgbClr val="3D372E"/>
+                          </a:solidFill>
+                          <a:latin typeface="Helvetica"/>
+                          <a:cs typeface="Helvetica"/>
+                        </a:rPr>
+                        <a:t>Spatial</a:t>
+                      </a:r>
+                    </a:p>
+                  </a:txBody>
+                  <a:tcPr/>
+                </a:tc>
+                <a:tc>
+                  <a:txBody>
+                    <a:bodyPr/>
+                    <a:lstStyle/>
+                    <a:p>
+                      <a:r>
+                        <a:rPr lang="en-US" b="1" dirty="0">
+                          <a:solidFill>
+                            <a:srgbClr val="3D372E"/>
+                          </a:solidFill>
+                          <a:latin typeface="Helvetica"/>
+                          <a:cs typeface="Helvetica"/>
+                        </a:rPr>
+                        <a:t>3.65</a:t>
+                      </a:r>
+                    </a:p>
+                  </a:txBody>
+                  <a:tcPr/>
+                </a:tc>
+                <a:extLst>
+                  <a:ext uri="{0D108BD9-81ED-4DB2-BD59-A6C34878D82A}">
+                    <a16:rowId xmlns:a16="http://schemas.microsoft.com/office/drawing/2014/main" val="10000"/>
+                  </a:ext>
+                </a:extLst>
+              </a:tr>
+              <a:tr h="419100">
+                <a:tc>
+                  <a:txBody>
+                    <a:bodyPr/>
+                    <a:lstStyle/>
+                    <a:p>
+                      <a:r>
+                        <a:rPr lang="en-US" b="1" dirty="0">
+                          <a:solidFill>
+                            <a:srgbClr val="3D372E"/>
+                          </a:solidFill>
+                          <a:latin typeface="Helvetica"/>
+                          <a:cs typeface="Helvetica"/>
+                        </a:rPr>
+                        <a:t>LASSO</a:t>
+                      </a:r>
+                    </a:p>
+                  </a:txBody>
+                  <a:tcPr/>
+                </a:tc>
+                <a:tc>
+                  <a:txBody>
+                    <a:bodyPr/>
+                    <a:lstStyle/>
+                    <a:p>
+                      <a:r>
+                        <a:rPr lang="en-US" b="1" dirty="0">
+                          <a:solidFill>
+                            <a:srgbClr val="3D372E"/>
+                          </a:solidFill>
+                          <a:latin typeface="Helvetica"/>
+                          <a:cs typeface="Helvetica"/>
+                        </a:rPr>
+                        <a:t>252.43</a:t>
+                      </a:r>
+                    </a:p>
+                  </a:txBody>
+                  <a:tcPr/>
+                </a:tc>
+                <a:extLst>
+                  <a:ext uri="{0D108BD9-81ED-4DB2-BD59-A6C34878D82A}">
+                    <a16:rowId xmlns:a16="http://schemas.microsoft.com/office/drawing/2014/main" val="10001"/>
+                  </a:ext>
+                </a:extLst>
+              </a:tr>
+            </a:tbl>
+          </a:graphicData>
+        </a:graphic>
+      </p:graphicFrame>
+      <p:sp>
+        <p:nvSpPr>
+          <p:cNvPr id="10" name="TextBox 9"/>
+          <p:cNvSpPr txBox="1"/>
+          <p:nvPr/>
+        </p:nvSpPr>
+        <p:spPr>
+          <a:xfrm>
+            <a:off x="457200" y="2590800"/>
+            <a:ext cx="3048000" cy="646331"/>
+          </a:xfrm>
+          <a:prstGeom prst="rect">
+            <a:avLst/>
+          </a:prstGeom>
+          <a:noFill/>
+        </p:spPr>
+        <p:txBody>
+          <a:bodyPr wrap="square" rtlCol="0">
+            <a:spAutoFit/>
+          </a:bodyPr>
+          <a:lstStyle/>
+          <a:p>
+            <a:r>
+              <a:rPr lang="en-US" b="1" dirty="0">
+                <a:solidFill>
+                  <a:schemeClr val="bg1"/>
+                </a:solidFill>
+                <a:latin typeface="Helvetica"/>
+                <a:cs typeface="Helvetica"/>
+              </a:rPr>
+              <a:t>Moran’s I</a:t>
+            </a:r>
+          </a:p>
+          <a:p>
+            <a:endParaRPr lang="en-US" b="1" dirty="0">
+              <a:solidFill>
+                <a:schemeClr val="bg1"/>
+              </a:solidFill>
+              <a:latin typeface="Helvetica"/>
+              <a:cs typeface="Helvetica"/>
+            </a:endParaRPr>
+          </a:p>
+        </p:txBody>
+      </p:sp>
+      <p:graphicFrame>
+        <p:nvGraphicFramePr>
+          <p:cNvPr id="11" name="Table 10"/>
+          <p:cNvGraphicFramePr>
+            <a:graphicFrameLocks noGrp="1"/>
+          </p:cNvGraphicFramePr>
+          <p:nvPr>
+            <p:extLst>
+              <p:ext uri="{D42A27DB-BD31-4B8C-83A1-F6EECF244321}">
+                <p14:modId xmlns:p14="http://schemas.microsoft.com/office/powerpoint/2010/main" val="2109355968"/>
+              </p:ext>
+            </p:extLst>
+          </p:nvPr>
+        </p:nvGraphicFramePr>
+        <p:xfrm>
+          <a:off x="533400" y="3048000"/>
+          <a:ext cx="3124200" cy="419100"/>
+        </p:xfrm>
+        <a:graphic>
+          <a:graphicData uri="http://schemas.openxmlformats.org/drawingml/2006/table">
+            <a:tbl>
+              <a:tblPr firstRow="1" bandRow="1">
+                <a:tableStyleId>{3B4B98B0-60AC-42C2-AFA5-B58CD77FA1E5}</a:tableStyleId>
+              </a:tblPr>
+              <a:tblGrid>
+                <a:gridCol w="1524000">
+                  <a:extLst>
+                    <a:ext uri="{9D8B030D-6E8A-4147-A177-3AD203B41FA5}">
+                      <a16:colId xmlns:a16="http://schemas.microsoft.com/office/drawing/2014/main" val="20000"/>
+                    </a:ext>
+                  </a:extLst>
+                </a:gridCol>
+                <a:gridCol w="1600200">
+                  <a:extLst>
+                    <a:ext uri="{9D8B030D-6E8A-4147-A177-3AD203B41FA5}">
+                      <a16:colId xmlns:a16="http://schemas.microsoft.com/office/drawing/2014/main" val="20001"/>
+                    </a:ext>
+                  </a:extLst>
+                </a:gridCol>
+              </a:tblGrid>
+              <a:tr h="419100">
+                <a:tc>
+                  <a:txBody>
+                    <a:bodyPr/>
+                    <a:lstStyle/>
+                    <a:p>
+                      <a:r>
+                        <a:rPr lang="en-US" b="1" dirty="0">
+                          <a:solidFill>
+                            <a:srgbClr val="3D372E"/>
+                          </a:solidFill>
+                          <a:latin typeface="Helvetica"/>
+                          <a:cs typeface="Helvetica"/>
+                        </a:rPr>
+                        <a:t>Spatial</a:t>
+                      </a:r>
+                    </a:p>
+                  </a:txBody>
+                  <a:tcPr/>
+                </a:tc>
+                <a:tc>
+                  <a:txBody>
+                    <a:bodyPr/>
+                    <a:lstStyle/>
+                    <a:p>
+                      <a:r>
+                        <a:rPr lang="en-US" b="1" dirty="0">
+                          <a:solidFill>
+                            <a:srgbClr val="3D372E"/>
+                          </a:solidFill>
+                          <a:latin typeface="Helvetica"/>
+                          <a:cs typeface="Helvetica"/>
+                        </a:rPr>
+                        <a:t>0.51</a:t>
+                      </a:r>
+                    </a:p>
+                  </a:txBody>
+                  <a:tcPr/>
+                </a:tc>
+                <a:extLst>
+                  <a:ext uri="{0D108BD9-81ED-4DB2-BD59-A6C34878D82A}">
+                    <a16:rowId xmlns:a16="http://schemas.microsoft.com/office/drawing/2014/main" val="10000"/>
+                  </a:ext>
+                </a:extLst>
+              </a:tr>
+            </a:tbl>
+          </a:graphicData>
+        </a:graphic>
+      </p:graphicFrame>
+      <p:pic>
+        <p:nvPicPr>
+          <p:cNvPr id="3" name="Picture 2"/>
+          <p:cNvPicPr>
+            <a:picLocks noChangeAspect="1"/>
+          </p:cNvPicPr>
+          <p:nvPr/>
+        </p:nvPicPr>
+        <p:blipFill>
+          <a:blip r:embed="rId2"/>
+          <a:stretch>
+            <a:fillRect/>
+          </a:stretch>
+        </p:blipFill>
+        <p:spPr>
+          <a:xfrm>
+            <a:off x="4114800" y="106811"/>
+            <a:ext cx="7696200" cy="6260639"/>
+          </a:xfrm>
+          <a:prstGeom prst="rect">
+            <a:avLst/>
+          </a:prstGeom>
+        </p:spPr>
+      </p:pic>
+    </p:spTree>
+    <p:extLst>
+      <p:ext uri="{BB962C8B-B14F-4D97-AF65-F5344CB8AC3E}">
+        <p14:creationId xmlns:p14="http://schemas.microsoft.com/office/powerpoint/2010/main" val="680897231"/>
+      </p:ext>
+    </p:extLst>
+  </p:cSld>
+  <p:clrMapOvr>
+    <a:masterClrMapping/>
+  </p:clrMapOvr>
+  <mc:AlternateContent xmlns:mc="http://schemas.openxmlformats.org/markup-compatibility/2006" xmlns:p14="http://schemas.microsoft.com/office/powerpoint/2010/main">
+    <mc:Choice Requires="p14">
+      <p:transition spd="med" p14:dur="700">
+        <p:fade/>
+      </p:transition>
+    </mc:Choice>
+    <mc:Fallback xmlns="">
+      <p:transition spd="med">
+        <p:fade/>
+      </p:transition>
+    </mc:Fallback>
+  </mc:AlternateContent>
+</p:sld>
+</file>
+
+<file path=ppt/slides/slide17.xml><?xml version="1.0" encoding="utf-8"?>
+<p:sld xmlns:a="http://schemas.openxmlformats.org/drawingml/2006/main" xmlns:r="http://schemas.openxmlformats.org/officeDocument/2006/relationships" xmlns:p="http://schemas.openxmlformats.org/presentationml/2006/main">
+  <p:cSld>
+    <p:bg>
+      <p:bgPr>
+        <a:solidFill>
+          <a:schemeClr val="tx1"/>
+        </a:solidFill>
+        <a:effectLst/>
+      </p:bgPr>
+    </p:bg>
+    <p:spTree>
+      <p:nvGrpSpPr>
+        <p:cNvPr id="1" name=""/>
+        <p:cNvGrpSpPr/>
+        <p:nvPr/>
+      </p:nvGrpSpPr>
+      <p:grpSpPr>
+        <a:xfrm>
+          <a:off x="0" y="0"/>
+          <a:ext cx="0" cy="0"/>
+          <a:chOff x="0" y="0"/>
+          <a:chExt cx="0" cy="0"/>
+        </a:xfrm>
+      </p:grpSpPr>
+      <p:sp>
+        <p:nvSpPr>
           <p:cNvPr id="3" name="Content Placeholder 2"/>
           <p:cNvSpPr>
             <a:spLocks noGrp="1"/>
@@ -8337,7 +8308,7 @@
           <a:lstStyle/>
           <a:p>
             <a:r>
-              <a:rPr lang="en-US" sz="2400" dirty="0" smtClean="0">
+              <a:rPr lang="en-US" sz="2400" dirty="0">
                 <a:solidFill>
                   <a:srgbClr val="736756"/>
                 </a:solidFill>
@@ -8350,7 +8321,7 @@
           <a:p>
             <a:pPr lvl="1"/>
             <a:r>
-              <a:rPr lang="en-US" sz="2200" dirty="0" smtClean="0">
+              <a:rPr lang="en-US" sz="2200" dirty="0">
                 <a:solidFill>
                   <a:srgbClr val="736756"/>
                 </a:solidFill>
@@ -8359,7 +8330,7 @@
               </a:rPr>
               <a:t>Strong yearly and autoregressive trends</a:t>
             </a:r>
-            <a:endParaRPr lang="en-US" sz="2200" dirty="0" smtClean="0">
+            <a:endParaRPr lang="en-US" sz="2200" dirty="0">
               <a:solidFill>
                 <a:schemeClr val="bg2">
                   <a:lumMod val="65000"/>
@@ -8405,7 +8376,7 @@
           <a:lstStyle/>
           <a:p>
             <a:r>
-              <a:rPr lang="en-US" dirty="0" smtClean="0">
+              <a:rPr lang="en-US" dirty="0">
                 <a:solidFill>
                   <a:srgbClr val="736756"/>
                 </a:solidFill>
@@ -8414,13 +8385,6 @@
               </a:rPr>
               <a:t>Conclusions</a:t>
             </a:r>
-            <a:endParaRPr lang="en-US" dirty="0">
-              <a:solidFill>
-                <a:srgbClr val="736756"/>
-              </a:solidFill>
-              <a:latin typeface="Helvetica"/>
-              <a:cs typeface="Helvetica"/>
-            </a:endParaRPr>
           </a:p>
         </p:txBody>
       </p:sp>
@@ -8446,17 +8410,10 @@
       </p:transition>
     </mc:Fallback>
   </mc:AlternateContent>
-  <p:timing>
-    <p:tnLst>
-      <p:par>
-        <p:cTn xmlns:p14="http://schemas.microsoft.com/office/powerpoint/2010/main" id="1" dur="indefinite" restart="never" nodeType="tmRoot"/>
-      </p:par>
-    </p:tnLst>
-  </p:timing>
 </p:sld>
 </file>
 
-<file path=ppt/slides/slide17.xml><?xml version="1.0" encoding="utf-8"?>
+<file path=ppt/slides/slide18.xml><?xml version="1.0" encoding="utf-8"?>
 <p:sld xmlns:a="http://schemas.openxmlformats.org/drawingml/2006/main" xmlns:r="http://schemas.openxmlformats.org/officeDocument/2006/relationships" xmlns:p="http://schemas.openxmlformats.org/presentationml/2006/main">
   <p:cSld>
     <p:spTree>
@@ -8494,16 +8451,12 @@
           <a:lstStyle/>
           <a:p>
             <a:r>
-              <a:rPr lang="en-US" dirty="0" smtClean="0">
+              <a:rPr lang="en-US" dirty="0">
                 <a:latin typeface="Helvetica"/>
                 <a:cs typeface="Helvetica"/>
               </a:rPr>
               <a:t>Next Steps</a:t>
             </a:r>
-            <a:endParaRPr lang="en-US" dirty="0">
-              <a:latin typeface="Helvetica"/>
-              <a:cs typeface="Helvetica"/>
-            </a:endParaRPr>
           </a:p>
         </p:txBody>
       </p:sp>
@@ -8598,13 +8551,6 @@
       </p:transition>
     </mc:Fallback>
   </mc:AlternateContent>
-  <p:timing>
-    <p:tnLst>
-      <p:par>
-        <p:cTn xmlns:p14="http://schemas.microsoft.com/office/powerpoint/2010/main" id="1" dur="indefinite" restart="never" nodeType="tmRoot"/>
-      </p:par>
-    </p:tnLst>
-  </p:timing>
 </p:sld>
 </file>
 
@@ -8748,7 +8694,7 @@
           <a:noFill/>
           <a:extLst>
             <a:ext uri="{909E8E84-426E-40dd-AFC4-6F175D3DCCD1}">
-              <a14:hiddenFill xmlns:a14="http://schemas.microsoft.com/office/drawing/2010/main">
+              <a14:hiddenFill xmlns:a14="http://schemas.microsoft.com/office/drawing/2010/main" xmlns="">
                 <a:solidFill>
                   <a:srgbClr val="FFFFFF"/>
                 </a:solidFill>
@@ -8778,7 +8724,7 @@
           <a:lstStyle/>
           <a:p>
             <a:r>
-              <a:rPr lang="en-US" dirty="0" smtClean="0">
+              <a:rPr lang="en-US" dirty="0">
                 <a:solidFill>
                   <a:schemeClr val="accent6">
                     <a:lumMod val="75000"/>
@@ -8789,15 +8735,6 @@
               </a:rPr>
               <a:t>Is Chicago a War Zone?</a:t>
             </a:r>
-            <a:endParaRPr lang="en-US" dirty="0">
-              <a:solidFill>
-                <a:schemeClr val="accent6">
-                  <a:lumMod val="75000"/>
-                </a:schemeClr>
-              </a:solidFill>
-              <a:latin typeface="Helvetica"/>
-              <a:cs typeface="Helvetica"/>
-            </a:endParaRPr>
           </a:p>
         </p:txBody>
       </p:sp>
@@ -8823,13 +8760,6 @@
       </p:transition>
     </mc:Fallback>
   </mc:AlternateContent>
-  <p:timing>
-    <p:tnLst>
-      <p:par>
-        <p:cTn xmlns:p14="http://schemas.microsoft.com/office/powerpoint/2010/main" id="1" dur="indefinite" restart="never" nodeType="tmRoot"/>
-      </p:par>
-    </p:tnLst>
-  </p:timing>
 </p:sld>
 </file>
 
@@ -8903,7 +8833,7 @@
           <a:lstStyle/>
           <a:p>
             <a:r>
-              <a:rPr lang="en-US" dirty="0" smtClean="0">
+              <a:rPr lang="en-US" dirty="0">
                 <a:solidFill>
                   <a:schemeClr val="accent6">
                     <a:lumMod val="75000"/>
@@ -8914,15 +8844,6 @@
               </a:rPr>
               <a:t>Data Sources</a:t>
             </a:r>
-            <a:endParaRPr lang="en-US" dirty="0">
-              <a:solidFill>
-                <a:schemeClr val="accent6">
-                  <a:lumMod val="75000"/>
-                </a:schemeClr>
-              </a:solidFill>
-              <a:latin typeface="Helvetica"/>
-              <a:cs typeface="Helvetica"/>
-            </a:endParaRPr>
           </a:p>
         </p:txBody>
       </p:sp>
@@ -8948,13 +8869,6 @@
       </p:transition>
     </mc:Fallback>
   </mc:AlternateContent>
-  <p:timing>
-    <p:tnLst>
-      <p:par>
-        <p:cTn xmlns:p14="http://schemas.microsoft.com/office/powerpoint/2010/main" id="1" dur="indefinite" restart="never" nodeType="tmRoot"/>
-      </p:par>
-    </p:tnLst>
-  </p:timing>
 </p:sld>
 </file>
 
@@ -9096,13 +9010,6 @@
       </p:transition>
     </mc:Fallback>
   </mc:AlternateContent>
-  <p:timing>
-    <p:tnLst>
-      <p:par>
-        <p:cTn xmlns:p14="http://schemas.microsoft.com/office/powerpoint/2010/main" id="1" dur="indefinite" restart="never" nodeType="tmRoot"/>
-      </p:par>
-    </p:tnLst>
-  </p:timing>
 </p:sld>
 </file>
 
@@ -9174,16 +9081,12 @@
           <a:lstStyle/>
           <a:p>
             <a:r>
-              <a:rPr lang="en-US" dirty="0" smtClean="0">
+              <a:rPr lang="en-US" dirty="0">
                 <a:latin typeface="Helvetica"/>
                 <a:cs typeface="Helvetica"/>
               </a:rPr>
               <a:t>A time series analysis of crime data</a:t>
             </a:r>
-            <a:endParaRPr lang="en-US" dirty="0">
-              <a:latin typeface="Helvetica"/>
-              <a:cs typeface="Helvetica"/>
-            </a:endParaRPr>
           </a:p>
         </p:txBody>
       </p:sp>
@@ -9209,13 +9112,6 @@
       </p:transition>
     </mc:Fallback>
   </mc:AlternateContent>
-  <p:timing>
-    <p:tnLst>
-      <p:par>
-        <p:cTn xmlns:p14="http://schemas.microsoft.com/office/powerpoint/2010/main" id="1" dur="indefinite" restart="never" nodeType="tmRoot"/>
-      </p:par>
-    </p:tnLst>
-  </p:timing>
 </p:sld>
 </file>
 
@@ -9295,7 +9191,7 @@
           <a:lstStyle/>
           <a:p>
             <a:r>
-              <a:rPr lang="en-US" dirty="0" smtClean="0">
+              <a:rPr lang="en-US" dirty="0">
                 <a:solidFill>
                   <a:schemeClr val="accent6">
                     <a:lumMod val="75000"/>
@@ -9306,15 +9202,6 @@
               </a:rPr>
               <a:t>“Sides” of Chicago</a:t>
             </a:r>
-            <a:endParaRPr lang="en-US" dirty="0">
-              <a:solidFill>
-                <a:schemeClr val="accent6">
-                  <a:lumMod val="75000"/>
-                </a:schemeClr>
-              </a:solidFill>
-              <a:latin typeface="Helvetica"/>
-              <a:cs typeface="Helvetica"/>
-            </a:endParaRPr>
           </a:p>
         </p:txBody>
       </p:sp>
@@ -9340,13 +9227,6 @@
       </p:transition>
     </mc:Fallback>
   </mc:AlternateContent>
-  <p:timing>
-    <p:tnLst>
-      <p:par>
-        <p:cTn xmlns:p14="http://schemas.microsoft.com/office/powerpoint/2010/main" id="1" dur="indefinite" restart="never" nodeType="tmRoot"/>
-      </p:par>
-    </p:tnLst>
-  </p:timing>
 </p:sld>
 </file>
 
@@ -9456,7 +9336,7 @@
           <a:lstStyle/>
           <a:p>
             <a:r>
-              <a:rPr lang="en-US" dirty="0" smtClean="0">
+              <a:rPr lang="en-US" dirty="0">
                 <a:solidFill>
                   <a:schemeClr val="accent6">
                     <a:lumMod val="75000"/>
@@ -9467,15 +9347,6 @@
               </a:rPr>
               <a:t>“Sides” of Chicago, cont.</a:t>
             </a:r>
-            <a:endParaRPr lang="en-US" dirty="0">
-              <a:solidFill>
-                <a:schemeClr val="accent6">
-                  <a:lumMod val="75000"/>
-                </a:schemeClr>
-              </a:solidFill>
-              <a:latin typeface="Helvetica"/>
-              <a:cs typeface="Helvetica"/>
-            </a:endParaRPr>
           </a:p>
         </p:txBody>
       </p:sp>
@@ -9501,13 +9372,6 @@
       </p:transition>
     </mc:Fallback>
   </mc:AlternateContent>
-  <p:timing>
-    <p:tnLst>
-      <p:par>
-        <p:cTn xmlns:p14="http://schemas.microsoft.com/office/powerpoint/2010/main" id="1" dur="indefinite" restart="never" nodeType="tmRoot"/>
-      </p:par>
-    </p:tnLst>
-  </p:timing>
 </p:sld>
 </file>
 
@@ -9557,7 +9421,7 @@
           <a:lstStyle/>
           <a:p>
             <a:r>
-              <a:rPr lang="en-US" dirty="0" smtClean="0">
+              <a:rPr lang="en-US" dirty="0">
                 <a:solidFill>
                   <a:schemeClr val="accent6">
                     <a:lumMod val="75000"/>
@@ -9568,15 +9432,6 @@
               </a:rPr>
               <a:t>South Side</a:t>
             </a:r>
-            <a:endParaRPr lang="en-US" dirty="0">
-              <a:solidFill>
-                <a:schemeClr val="accent6">
-                  <a:lumMod val="75000"/>
-                </a:schemeClr>
-              </a:solidFill>
-              <a:latin typeface="Helvetica"/>
-              <a:cs typeface="Helvetica"/>
-            </a:endParaRPr>
           </a:p>
         </p:txBody>
       </p:sp>
@@ -9660,13 +9515,6 @@
       </p:transition>
     </mc:Fallback>
   </mc:AlternateContent>
-  <p:timing>
-    <p:tnLst>
-      <p:par>
-        <p:cTn xmlns:p14="http://schemas.microsoft.com/office/powerpoint/2010/main" id="1" dur="indefinite" restart="never" nodeType="tmRoot"/>
-      </p:par>
-    </p:tnLst>
-  </p:timing>
 </p:sld>
 </file>
 
@@ -9716,7 +9564,7 @@
           <a:lstStyle/>
           <a:p>
             <a:r>
-              <a:rPr lang="en-US" dirty="0" smtClean="0">
+              <a:rPr lang="en-US" dirty="0">
                 <a:solidFill>
                   <a:schemeClr val="accent6">
                     <a:lumMod val="75000"/>
@@ -9728,7 +9576,7 @@
               <a:t>South Side </a:t>
             </a:r>
             <a:r>
-              <a:rPr lang="mr-IN" dirty="0" smtClean="0">
+              <a:rPr lang="mr-IN" dirty="0">
                 <a:solidFill>
                   <a:schemeClr val="accent6">
                     <a:lumMod val="75000"/>
@@ -9740,7 +9588,7 @@
               <a:t>–</a:t>
             </a:r>
             <a:r>
-              <a:rPr lang="en-US" dirty="0" smtClean="0">
+              <a:rPr lang="en-US" dirty="0">
                 <a:solidFill>
                   <a:schemeClr val="accent6">
                     <a:lumMod val="75000"/>
@@ -9751,15 +9599,6 @@
               </a:rPr>
               <a:t> ARIMA(4,0,0)x(1,0,0)[12]</a:t>
             </a:r>
-            <a:endParaRPr lang="en-US" dirty="0">
-              <a:solidFill>
-                <a:schemeClr val="accent6">
-                  <a:lumMod val="75000"/>
-                </a:schemeClr>
-              </a:solidFill>
-              <a:latin typeface="Helvetica"/>
-              <a:cs typeface="Helvetica"/>
-            </a:endParaRPr>
           </a:p>
         </p:txBody>
       </p:sp>
@@ -9844,13 +9683,6 @@
       </p:transition>
     </mc:Fallback>
   </mc:AlternateContent>
-  <p:timing>
-    <p:tnLst>
-      <p:par>
-        <p:cTn xmlns:p14="http://schemas.microsoft.com/office/powerpoint/2010/main" id="1" dur="indefinite" restart="never" nodeType="tmRoot"/>
-      </p:par>
-    </p:tnLst>
-  </p:timing>
 </p:sld>
 </file>
 
@@ -10109,7 +9941,7 @@
   <a:extraClrSchemeLst/>
   <a:extLst>
     <a:ext uri="{05A4C25C-085E-4340-85A3-A5531E510DB2}">
-      <thm15:themeFamily xmlns="" xmlns:thm15="http://schemas.microsoft.com/office/thememl/2012/main" name="TF00001123.potx" id="{55B65C5C-2110-41C9-9432-67D739EC5CFC}" vid="{FDE12540-4521-4F30-863D-D54DD2EE1C3B}"/>
+      <thm15:themeFamily xmlns:thm15="http://schemas.microsoft.com/office/thememl/2012/main" name="TF00001123.potx" id="{55B65C5C-2110-41C9-9432-67D739EC5CFC}" vid="{FDE12540-4521-4F30-863D-D54DD2EE1C3B}"/>
     </a:ext>
   </a:extLst>
 </a:theme>
@@ -10690,7 +10522,7 @@
   <a:extraClrSchemeLst/>
   <a:extLst>
     <a:ext uri="{05A4C25C-085E-4340-85A3-A5531E510DB2}">
-      <thm15:themeFamily xmlns="" xmlns:thm15="http://schemas.microsoft.com/office/thememl/2012/main" name="Office Theme" id="{62F939B6-93AF-4DB8-9C6B-D6C7DFDC589F}" vid="{4A3C46E8-61CC-4603-A589-7422A47A8E4A}"/>
+      <thm15:themeFamily xmlns:thm15="http://schemas.microsoft.com/office/thememl/2012/main" name="Office Theme" id="{62F939B6-93AF-4DB8-9C6B-D6C7DFDC589F}" vid="{4A3C46E8-61CC-4603-A589-7422A47A8E4A}"/>
     </a:ext>
   </a:extLst>
 </a:theme>
@@ -10951,7 +10783,7 @@
   <a:extraClrSchemeLst/>
   <a:extLst>
     <a:ext uri="{05A4C25C-085E-4340-85A3-A5531E510DB2}">
-      <thm15:themeFamily xmlns="" xmlns:thm15="http://schemas.microsoft.com/office/thememl/2012/main" name="Office Theme" id="{62F939B6-93AF-4DB8-9C6B-D6C7DFDC589F}" vid="{4A3C46E8-61CC-4603-A589-7422A47A8E4A}"/>
+      <thm15:themeFamily xmlns:thm15="http://schemas.microsoft.com/office/thememl/2012/main" name="Office Theme" id="{62F939B6-93AF-4DB8-9C6B-D6C7DFDC589F}" vid="{4A3C46E8-61CC-4603-A589-7422A47A8E4A}"/>
     </a:ext>
   </a:extLst>
 </a:theme>

</xml_diff>

<commit_message>
turn and face the change
</commit_message>
<xml_diff>
--- a/Slides/final_slides.pptx
+++ b/Slides/final_slides.pptx
@@ -7328,7 +7328,7 @@
       </p:sp>
       <p:pic>
         <p:nvPicPr>
-          <p:cNvPr id="5" name="Picture 4"/>
+          <p:cNvPr id="6" name="Picture 5"/>
           <p:cNvPicPr>
             <a:picLocks noChangeAspect="1"/>
           </p:cNvPicPr>
@@ -7342,8 +7342,8 @@
         </p:blipFill>
         <p:spPr>
           <a:xfrm>
-            <a:off x="1638300" y="1828800"/>
-            <a:ext cx="8915400" cy="3328675"/>
+            <a:off x="914401" y="1981200"/>
+            <a:ext cx="9601200" cy="3387714"/>
           </a:xfrm>
           <a:prstGeom prst="rect">
             <a:avLst/>
@@ -7568,7 +7568,7 @@
       </p:pic>
       <p:pic>
         <p:nvPicPr>
-          <p:cNvPr id="9" name="Picture 8"/>
+          <p:cNvPr id="3" name="Picture 2"/>
           <p:cNvPicPr>
             <a:picLocks noChangeAspect="1"/>
           </p:cNvPicPr>
@@ -7582,8 +7582,8 @@
         </p:blipFill>
         <p:spPr>
           <a:xfrm>
-            <a:off x="4152900" y="1828800"/>
-            <a:ext cx="3771900" cy="4286250"/>
+            <a:off x="342900" y="1981200"/>
+            <a:ext cx="11493500" cy="2882900"/>
           </a:xfrm>
           <a:prstGeom prst="rect">
             <a:avLst/>

</xml_diff>